<commit_message>
Algo Topic wise pyq
</commit_message>
<xml_diff>
--- a/GATE/Algorithms/Topic Wise PYQ.pptx
+++ b/GATE/Algorithms/Topic Wise PYQ.pptx
@@ -6,6 +6,43 @@
   </p:sldMasterIdLst>
   <p:sldIdLst>
     <p:sldId id="256" r:id="rId2"/>
+    <p:sldId id="257" r:id="rId3"/>
+    <p:sldId id="258" r:id="rId4"/>
+    <p:sldId id="259" r:id="rId5"/>
+    <p:sldId id="260" r:id="rId6"/>
+    <p:sldId id="261" r:id="rId7"/>
+    <p:sldId id="262" r:id="rId8"/>
+    <p:sldId id="263" r:id="rId9"/>
+    <p:sldId id="264" r:id="rId10"/>
+    <p:sldId id="265" r:id="rId11"/>
+    <p:sldId id="266" r:id="rId12"/>
+    <p:sldId id="267" r:id="rId13"/>
+    <p:sldId id="268" r:id="rId14"/>
+    <p:sldId id="269" r:id="rId15"/>
+    <p:sldId id="270" r:id="rId16"/>
+    <p:sldId id="271" r:id="rId17"/>
+    <p:sldId id="277" r:id="rId18"/>
+    <p:sldId id="276" r:id="rId19"/>
+    <p:sldId id="272" r:id="rId20"/>
+    <p:sldId id="273" r:id="rId21"/>
+    <p:sldId id="274" r:id="rId22"/>
+    <p:sldId id="278" r:id="rId23"/>
+    <p:sldId id="279" r:id="rId24"/>
+    <p:sldId id="280" r:id="rId25"/>
+    <p:sldId id="285" r:id="rId26"/>
+    <p:sldId id="286" r:id="rId27"/>
+    <p:sldId id="287" r:id="rId28"/>
+    <p:sldId id="288" r:id="rId29"/>
+    <p:sldId id="289" r:id="rId30"/>
+    <p:sldId id="281" r:id="rId31"/>
+    <p:sldId id="290" r:id="rId32"/>
+    <p:sldId id="291" r:id="rId33"/>
+    <p:sldId id="282" r:id="rId34"/>
+    <p:sldId id="293" r:id="rId35"/>
+    <p:sldId id="292" r:id="rId36"/>
+    <p:sldId id="283" r:id="rId37"/>
+    <p:sldId id="284" r:id="rId38"/>
+    <p:sldId id="275" r:id="rId39"/>
   </p:sldIdLst>
   <p:sldSz cx="12192000" cy="6858000"/>
   <p:notesSz cx="6858000" cy="9144000"/>
@@ -104,6 +141,81 @@
       </a:defRPr>
     </a:lvl9pPr>
   </p:defaultTextStyle>
+  <p:extLst>
+    <p:ext uri="{521415D9-36F7-43E2-AB2F-B90AF26B5E84}">
+      <p14:sectionLst xmlns:p14="http://schemas.microsoft.com/office/powerpoint/2010/main">
+        <p14:section name="Topic Wise PYQ" id="{3B7E6F47-D738-4EB3-BE51-512026525C3A}">
+          <p14:sldIdLst>
+            <p14:sldId id="256"/>
+          </p14:sldIdLst>
+        </p14:section>
+        <p14:section name="Asymptotic Notation" id="{D9994D93-2B98-4408-B7E3-70E15B3DDFC0}">
+          <p14:sldIdLst>
+            <p14:sldId id="257"/>
+            <p14:sldId id="258"/>
+            <p14:sldId id="259"/>
+            <p14:sldId id="260"/>
+            <p14:sldId id="261"/>
+            <p14:sldId id="262"/>
+            <p14:sldId id="263"/>
+            <p14:sldId id="264"/>
+            <p14:sldId id="265"/>
+            <p14:sldId id="266"/>
+            <p14:sldId id="267"/>
+            <p14:sldId id="268"/>
+            <p14:sldId id="269"/>
+          </p14:sldIdLst>
+        </p14:section>
+        <p14:section name="Recurrence Relation" id="{E6F460E5-71F5-4757-848E-53B872BCAC16}">
+          <p14:sldIdLst>
+            <p14:sldId id="270"/>
+            <p14:sldId id="271"/>
+            <p14:sldId id="277"/>
+          </p14:sldIdLst>
+        </p14:section>
+        <p14:section name="Divide and Conquer" id="{A363C4A1-F2A4-4931-9329-99B0DBE63DFB}">
+          <p14:sldIdLst>
+            <p14:sldId id="276"/>
+            <p14:sldId id="272"/>
+            <p14:sldId id="273"/>
+          </p14:sldIdLst>
+        </p14:section>
+        <p14:section name="Sorting" id="{F8FBAF63-2F0D-4544-8717-BB444027D272}">
+          <p14:sldIdLst>
+            <p14:sldId id="274"/>
+            <p14:sldId id="278"/>
+            <p14:sldId id="279"/>
+          </p14:sldIdLst>
+        </p14:section>
+        <p14:section name="Greedy Technique" id="{F7807AB7-2350-4DFC-B99D-70A00F0B5D57}">
+          <p14:sldIdLst>
+            <p14:sldId id="280"/>
+            <p14:sldId id="285"/>
+            <p14:sldId id="286"/>
+            <p14:sldId id="287"/>
+            <p14:sldId id="288"/>
+          </p14:sldIdLst>
+        </p14:section>
+        <p14:section name="MST" id="{FBF0A782-2275-4CB5-9414-7D06AAABD88B}">
+          <p14:sldIdLst>
+            <p14:sldId id="289"/>
+            <p14:sldId id="281"/>
+            <p14:sldId id="290"/>
+            <p14:sldId id="291"/>
+            <p14:sldId id="282"/>
+            <p14:sldId id="293"/>
+            <p14:sldId id="292"/>
+            <p14:sldId id="283"/>
+            <p14:sldId id="284"/>
+            <p14:sldId id="275"/>
+          </p14:sldIdLst>
+        </p14:section>
+      </p14:sectionLst>
+    </p:ext>
+    <p:ext uri="{EFAFB233-063F-42B5-8137-9DF3F51BA10A}">
+      <p15:sldGuideLst xmlns:p15="http://schemas.microsoft.com/office/powerpoint/2012/main"/>
+    </p:ext>
+  </p:extLst>
 </p:presentation>
 </file>
 
@@ -256,7 +368,7 @@
           <a:p>
             <a:fld id="{77ECC6D1-DC20-4CDE-9535-8532D0AFDFC1}" type="datetimeFigureOut">
               <a:rPr lang="en-IN" smtClean="0"/>
-              <a:t>04-02-2026</a:t>
+              <a:t>05-02-2026</a:t>
             </a:fld>
             <a:endParaRPr lang="en-IN"/>
           </a:p>
@@ -456,7 +568,7 @@
           <a:p>
             <a:fld id="{77ECC6D1-DC20-4CDE-9535-8532D0AFDFC1}" type="datetimeFigureOut">
               <a:rPr lang="en-IN" smtClean="0"/>
-              <a:t>04-02-2026</a:t>
+              <a:t>05-02-2026</a:t>
             </a:fld>
             <a:endParaRPr lang="en-IN"/>
           </a:p>
@@ -666,7 +778,7 @@
           <a:p>
             <a:fld id="{77ECC6D1-DC20-4CDE-9535-8532D0AFDFC1}" type="datetimeFigureOut">
               <a:rPr lang="en-IN" smtClean="0"/>
-              <a:t>04-02-2026</a:t>
+              <a:t>05-02-2026</a:t>
             </a:fld>
             <a:endParaRPr lang="en-IN"/>
           </a:p>
@@ -866,7 +978,7 @@
           <a:p>
             <a:fld id="{77ECC6D1-DC20-4CDE-9535-8532D0AFDFC1}" type="datetimeFigureOut">
               <a:rPr lang="en-IN" smtClean="0"/>
-              <a:t>04-02-2026</a:t>
+              <a:t>05-02-2026</a:t>
             </a:fld>
             <a:endParaRPr lang="en-IN"/>
           </a:p>
@@ -1142,7 +1254,7 @@
           <a:p>
             <a:fld id="{77ECC6D1-DC20-4CDE-9535-8532D0AFDFC1}" type="datetimeFigureOut">
               <a:rPr lang="en-IN" smtClean="0"/>
-              <a:t>04-02-2026</a:t>
+              <a:t>05-02-2026</a:t>
             </a:fld>
             <a:endParaRPr lang="en-IN"/>
           </a:p>
@@ -1410,7 +1522,7 @@
           <a:p>
             <a:fld id="{77ECC6D1-DC20-4CDE-9535-8532D0AFDFC1}" type="datetimeFigureOut">
               <a:rPr lang="en-IN" smtClean="0"/>
-              <a:t>04-02-2026</a:t>
+              <a:t>05-02-2026</a:t>
             </a:fld>
             <a:endParaRPr lang="en-IN"/>
           </a:p>
@@ -1825,7 +1937,7 @@
           <a:p>
             <a:fld id="{77ECC6D1-DC20-4CDE-9535-8532D0AFDFC1}" type="datetimeFigureOut">
               <a:rPr lang="en-IN" smtClean="0"/>
-              <a:t>04-02-2026</a:t>
+              <a:t>05-02-2026</a:t>
             </a:fld>
             <a:endParaRPr lang="en-IN"/>
           </a:p>
@@ -1967,7 +2079,7 @@
           <a:p>
             <a:fld id="{77ECC6D1-DC20-4CDE-9535-8532D0AFDFC1}" type="datetimeFigureOut">
               <a:rPr lang="en-IN" smtClean="0"/>
-              <a:t>04-02-2026</a:t>
+              <a:t>05-02-2026</a:t>
             </a:fld>
             <a:endParaRPr lang="en-IN"/>
           </a:p>
@@ -2080,7 +2192,7 @@
           <a:p>
             <a:fld id="{77ECC6D1-DC20-4CDE-9535-8532D0AFDFC1}" type="datetimeFigureOut">
               <a:rPr lang="en-IN" smtClean="0"/>
-              <a:t>04-02-2026</a:t>
+              <a:t>05-02-2026</a:t>
             </a:fld>
             <a:endParaRPr lang="en-IN"/>
           </a:p>
@@ -2393,7 +2505,7 @@
           <a:p>
             <a:fld id="{77ECC6D1-DC20-4CDE-9535-8532D0AFDFC1}" type="datetimeFigureOut">
               <a:rPr lang="en-IN" smtClean="0"/>
-              <a:t>04-02-2026</a:t>
+              <a:t>05-02-2026</a:t>
             </a:fld>
             <a:endParaRPr lang="en-IN"/>
           </a:p>
@@ -2682,7 +2794,7 @@
           <a:p>
             <a:fld id="{77ECC6D1-DC20-4CDE-9535-8532D0AFDFC1}" type="datetimeFigureOut">
               <a:rPr lang="en-IN" smtClean="0"/>
-              <a:t>04-02-2026</a:t>
+              <a:t>05-02-2026</a:t>
             </a:fld>
             <a:endParaRPr lang="en-IN"/>
           </a:p>
@@ -2925,7 +3037,7 @@
           <a:p>
             <a:fld id="{77ECC6D1-DC20-4CDE-9535-8532D0AFDFC1}" type="datetimeFigureOut">
               <a:rPr lang="en-IN" smtClean="0"/>
-              <a:t>04-02-2026</a:t>
+              <a:t>05-02-2026</a:t>
             </a:fld>
             <a:endParaRPr lang="en-IN"/>
           </a:p>
@@ -3363,16 +3475,599 @@
           <a:bodyPr/>
           <a:lstStyle/>
           <a:p>
-            <a:endParaRPr lang="en-IN"/>
+            <a:r>
+              <a:rPr lang="en-IN" b="1" dirty="0">
+                <a:solidFill>
+                  <a:srgbClr val="FF0000"/>
+                </a:solidFill>
+              </a:rPr>
+              <a:t>Topic Wise PYQ</a:t>
+            </a:r>
           </a:p>
         </p:txBody>
       </p:sp>
+    </p:spTree>
+    <p:extLst>
+      <p:ext uri="{BB962C8B-B14F-4D97-AF65-F5344CB8AC3E}">
+        <p14:creationId xmlns:p14="http://schemas.microsoft.com/office/powerpoint/2010/main" val="4053969307"/>
+      </p:ext>
+    </p:extLst>
+  </p:cSld>
+  <p:clrMapOvr>
+    <a:masterClrMapping/>
+  </p:clrMapOvr>
+</p:sld>
+</file>
+
+<file path=ppt/slides/slide10.xml><?xml version="1.0" encoding="utf-8"?>
+<p:sld xmlns:a="http://schemas.openxmlformats.org/drawingml/2006/main" xmlns:r="http://schemas.openxmlformats.org/officeDocument/2006/relationships" xmlns:p="http://schemas.openxmlformats.org/presentationml/2006/main">
+  <p:cSld>
+    <p:spTree>
+      <p:nvGrpSpPr>
+        <p:cNvPr id="1" name=""/>
+        <p:cNvGrpSpPr/>
+        <p:nvPr/>
+      </p:nvGrpSpPr>
+      <p:grpSpPr>
+        <a:xfrm>
+          <a:off x="0" y="0"/>
+          <a:ext cx="0" cy="0"/>
+          <a:chOff x="0" y="0"/>
+          <a:chExt cx="0" cy="0"/>
+        </a:xfrm>
+      </p:grpSpPr>
+      <p:pic>
+        <p:nvPicPr>
+          <p:cNvPr id="3" name="Picture 2">
+            <a:extLst>
+              <a:ext uri="{FF2B5EF4-FFF2-40B4-BE49-F238E27FC236}">
+                <a16:creationId xmlns:a16="http://schemas.microsoft.com/office/drawing/2014/main" id="{6786B24E-A459-43CC-A35F-6640C6613574}"/>
+              </a:ext>
+            </a:extLst>
+          </p:cNvPr>
+          <p:cNvPicPr>
+            <a:picLocks noChangeAspect="1"/>
+          </p:cNvPicPr>
+          <p:nvPr/>
+        </p:nvPicPr>
+        <p:blipFill>
+          <a:blip r:embed="rId2"/>
+          <a:stretch>
+            <a:fillRect/>
+          </a:stretch>
+        </p:blipFill>
+        <p:spPr>
+          <a:xfrm>
+            <a:off x="100067" y="78366"/>
+            <a:ext cx="7994901" cy="3929786"/>
+          </a:xfrm>
+          <a:prstGeom prst="rect">
+            <a:avLst/>
+          </a:prstGeom>
+        </p:spPr>
+      </p:pic>
+      <p:pic>
+        <p:nvPicPr>
+          <p:cNvPr id="9" name="Picture 8">
+            <a:extLst>
+              <a:ext uri="{FF2B5EF4-FFF2-40B4-BE49-F238E27FC236}">
+                <a16:creationId xmlns:a16="http://schemas.microsoft.com/office/drawing/2014/main" id="{2B874F70-BBCF-45EE-839D-47870D5CDF7F}"/>
+              </a:ext>
+            </a:extLst>
+          </p:cNvPr>
+          <p:cNvPicPr>
+            <a:picLocks noChangeAspect="1"/>
+          </p:cNvPicPr>
+          <p:nvPr/>
+        </p:nvPicPr>
+        <p:blipFill>
+          <a:blip r:embed="rId3">
+            <a:extLst>
+              <a:ext uri="{28A0092B-C50C-407E-A947-70E740481C1C}">
+                <a14:useLocalDpi xmlns:a14="http://schemas.microsoft.com/office/drawing/2010/main" val="0"/>
+              </a:ext>
+            </a:extLst>
+          </a:blip>
+          <a:stretch>
+            <a:fillRect/>
+          </a:stretch>
+        </p:blipFill>
+        <p:spPr>
+          <a:xfrm>
+            <a:off x="4663193" y="1916507"/>
+            <a:ext cx="6863550" cy="4684105"/>
+          </a:xfrm>
+          <a:prstGeom prst="rect">
+            <a:avLst/>
+          </a:prstGeom>
+        </p:spPr>
+      </p:pic>
+    </p:spTree>
+    <p:extLst>
+      <p:ext uri="{BB962C8B-B14F-4D97-AF65-F5344CB8AC3E}">
+        <p14:creationId xmlns:p14="http://schemas.microsoft.com/office/powerpoint/2010/main" val="533645432"/>
+      </p:ext>
+    </p:extLst>
+  </p:cSld>
+  <p:clrMapOvr>
+    <a:masterClrMapping/>
+  </p:clrMapOvr>
+</p:sld>
+</file>
+
+<file path=ppt/slides/slide11.xml><?xml version="1.0" encoding="utf-8"?>
+<p:sld xmlns:a="http://schemas.openxmlformats.org/drawingml/2006/main" xmlns:r="http://schemas.openxmlformats.org/officeDocument/2006/relationships" xmlns:p="http://schemas.openxmlformats.org/presentationml/2006/main">
+  <p:cSld>
+    <p:spTree>
+      <p:nvGrpSpPr>
+        <p:cNvPr id="1" name=""/>
+        <p:cNvGrpSpPr/>
+        <p:nvPr/>
+      </p:nvGrpSpPr>
+      <p:grpSpPr>
+        <a:xfrm>
+          <a:off x="0" y="0"/>
+          <a:ext cx="0" cy="0"/>
+          <a:chOff x="0" y="0"/>
+          <a:chExt cx="0" cy="0"/>
+        </a:xfrm>
+      </p:grpSpPr>
+      <p:pic>
+        <p:nvPicPr>
+          <p:cNvPr id="5" name="Picture 4">
+            <a:extLst>
+              <a:ext uri="{FF2B5EF4-FFF2-40B4-BE49-F238E27FC236}">
+                <a16:creationId xmlns:a16="http://schemas.microsoft.com/office/drawing/2014/main" id="{E2C6755A-A7B3-4000-B882-D5278E5D0800}"/>
+              </a:ext>
+            </a:extLst>
+          </p:cNvPr>
+          <p:cNvPicPr>
+            <a:picLocks noChangeAspect="1"/>
+          </p:cNvPicPr>
+          <p:nvPr/>
+        </p:nvPicPr>
+        <p:blipFill>
+          <a:blip r:embed="rId2"/>
+          <a:stretch>
+            <a:fillRect/>
+          </a:stretch>
+        </p:blipFill>
+        <p:spPr>
+          <a:xfrm>
+            <a:off x="0" y="0"/>
+            <a:ext cx="12192000" cy="2712393"/>
+          </a:xfrm>
+          <a:prstGeom prst="rect">
+            <a:avLst/>
+          </a:prstGeom>
+        </p:spPr>
+      </p:pic>
+      <p:pic>
+        <p:nvPicPr>
+          <p:cNvPr id="6" name="Picture 5">
+            <a:extLst>
+              <a:ext uri="{FF2B5EF4-FFF2-40B4-BE49-F238E27FC236}">
+                <a16:creationId xmlns:a16="http://schemas.microsoft.com/office/drawing/2014/main" id="{97B0C09E-1505-414F-A2CE-CC5CFB15DD01}"/>
+              </a:ext>
+            </a:extLst>
+          </p:cNvPr>
+          <p:cNvPicPr>
+            <a:picLocks noChangeAspect="1"/>
+          </p:cNvPicPr>
+          <p:nvPr/>
+        </p:nvPicPr>
+        <p:blipFill>
+          <a:blip r:embed="rId3"/>
+          <a:stretch>
+            <a:fillRect/>
+          </a:stretch>
+        </p:blipFill>
+        <p:spPr>
+          <a:xfrm>
+            <a:off x="1805688" y="1700914"/>
+            <a:ext cx="10107767" cy="4530829"/>
+          </a:xfrm>
+          <a:prstGeom prst="rect">
+            <a:avLst/>
+          </a:prstGeom>
+        </p:spPr>
+      </p:pic>
+    </p:spTree>
+    <p:extLst>
+      <p:ext uri="{BB962C8B-B14F-4D97-AF65-F5344CB8AC3E}">
+        <p14:creationId xmlns:p14="http://schemas.microsoft.com/office/powerpoint/2010/main" val="915597497"/>
+      </p:ext>
+    </p:extLst>
+  </p:cSld>
+  <p:clrMapOvr>
+    <a:masterClrMapping/>
+  </p:clrMapOvr>
+</p:sld>
+</file>
+
+<file path=ppt/slides/slide12.xml><?xml version="1.0" encoding="utf-8"?>
+<p:sld xmlns:a="http://schemas.openxmlformats.org/drawingml/2006/main" xmlns:r="http://schemas.openxmlformats.org/officeDocument/2006/relationships" xmlns:p="http://schemas.openxmlformats.org/presentationml/2006/main">
+  <p:cSld>
+    <p:spTree>
+      <p:nvGrpSpPr>
+        <p:cNvPr id="1" name=""/>
+        <p:cNvGrpSpPr/>
+        <p:nvPr/>
+      </p:nvGrpSpPr>
+      <p:grpSpPr>
+        <a:xfrm>
+          <a:off x="0" y="0"/>
+          <a:ext cx="0" cy="0"/>
+          <a:chOff x="0" y="0"/>
+          <a:chExt cx="0" cy="0"/>
+        </a:xfrm>
+      </p:grpSpPr>
+      <p:pic>
+        <p:nvPicPr>
+          <p:cNvPr id="5" name="Picture 4">
+            <a:extLst>
+              <a:ext uri="{FF2B5EF4-FFF2-40B4-BE49-F238E27FC236}">
+                <a16:creationId xmlns:a16="http://schemas.microsoft.com/office/drawing/2014/main" id="{589C5196-9982-470C-B294-901CE4B7919F}"/>
+              </a:ext>
+            </a:extLst>
+          </p:cNvPr>
+          <p:cNvPicPr>
+            <a:picLocks noChangeAspect="1"/>
+          </p:cNvPicPr>
+          <p:nvPr/>
+        </p:nvPicPr>
+        <p:blipFill>
+          <a:blip r:embed="rId2"/>
+          <a:stretch>
+            <a:fillRect/>
+          </a:stretch>
+        </p:blipFill>
+        <p:spPr>
+          <a:xfrm>
+            <a:off x="0" y="0"/>
+            <a:ext cx="5292854" cy="6768214"/>
+          </a:xfrm>
+          <a:prstGeom prst="rect">
+            <a:avLst/>
+          </a:prstGeom>
+        </p:spPr>
+      </p:pic>
+      <p:pic>
+        <p:nvPicPr>
+          <p:cNvPr id="6" name="Picture 5">
+            <a:extLst>
+              <a:ext uri="{FF2B5EF4-FFF2-40B4-BE49-F238E27FC236}">
+                <a16:creationId xmlns:a16="http://schemas.microsoft.com/office/drawing/2014/main" id="{EA35B7BF-2E5B-4A38-8AE5-A988B081345C}"/>
+              </a:ext>
+            </a:extLst>
+          </p:cNvPr>
+          <p:cNvPicPr>
+            <a:picLocks noChangeAspect="1"/>
+          </p:cNvPicPr>
+          <p:nvPr/>
+        </p:nvPicPr>
+        <p:blipFill>
+          <a:blip r:embed="rId3"/>
+          <a:stretch>
+            <a:fillRect/>
+          </a:stretch>
+        </p:blipFill>
+        <p:spPr>
+          <a:xfrm>
+            <a:off x="2737732" y="4322299"/>
+            <a:ext cx="9186360" cy="1974444"/>
+          </a:xfrm>
+          <a:prstGeom prst="rect">
+            <a:avLst/>
+          </a:prstGeom>
+        </p:spPr>
+      </p:pic>
+    </p:spTree>
+    <p:extLst>
+      <p:ext uri="{BB962C8B-B14F-4D97-AF65-F5344CB8AC3E}">
+        <p14:creationId xmlns:p14="http://schemas.microsoft.com/office/powerpoint/2010/main" val="2827286300"/>
+      </p:ext>
+    </p:extLst>
+  </p:cSld>
+  <p:clrMapOvr>
+    <a:masterClrMapping/>
+  </p:clrMapOvr>
+</p:sld>
+</file>
+
+<file path=ppt/slides/slide13.xml><?xml version="1.0" encoding="utf-8"?>
+<p:sld xmlns:a="http://schemas.openxmlformats.org/drawingml/2006/main" xmlns:r="http://schemas.openxmlformats.org/officeDocument/2006/relationships" xmlns:p="http://schemas.openxmlformats.org/presentationml/2006/main">
+  <p:cSld>
+    <p:spTree>
+      <p:nvGrpSpPr>
+        <p:cNvPr id="1" name=""/>
+        <p:cNvGrpSpPr/>
+        <p:nvPr/>
+      </p:nvGrpSpPr>
+      <p:grpSpPr>
+        <a:xfrm>
+          <a:off x="0" y="0"/>
+          <a:ext cx="0" cy="0"/>
+          <a:chOff x="0" y="0"/>
+          <a:chExt cx="0" cy="0"/>
+        </a:xfrm>
+      </p:grpSpPr>
+      <p:pic>
+        <p:nvPicPr>
+          <p:cNvPr id="3" name="Picture 2">
+            <a:extLst>
+              <a:ext uri="{FF2B5EF4-FFF2-40B4-BE49-F238E27FC236}">
+                <a16:creationId xmlns:a16="http://schemas.microsoft.com/office/drawing/2014/main" id="{A298603F-CC30-4D15-B71F-427CFE396C7F}"/>
+              </a:ext>
+            </a:extLst>
+          </p:cNvPr>
+          <p:cNvPicPr>
+            <a:picLocks noChangeAspect="1"/>
+          </p:cNvPicPr>
+          <p:nvPr/>
+        </p:nvPicPr>
+        <p:blipFill>
+          <a:blip r:embed="rId2"/>
+          <a:stretch>
+            <a:fillRect/>
+          </a:stretch>
+        </p:blipFill>
+        <p:spPr>
+          <a:xfrm>
+            <a:off x="502081" y="238994"/>
+            <a:ext cx="11187838" cy="6380010"/>
+          </a:xfrm>
+          <a:prstGeom prst="rect">
+            <a:avLst/>
+          </a:prstGeom>
+        </p:spPr>
+      </p:pic>
+    </p:spTree>
+    <p:extLst>
+      <p:ext uri="{BB962C8B-B14F-4D97-AF65-F5344CB8AC3E}">
+        <p14:creationId xmlns:p14="http://schemas.microsoft.com/office/powerpoint/2010/main" val="3504942126"/>
+      </p:ext>
+    </p:extLst>
+  </p:cSld>
+  <p:clrMapOvr>
+    <a:masterClrMapping/>
+  </p:clrMapOvr>
+</p:sld>
+</file>
+
+<file path=ppt/slides/slide14.xml><?xml version="1.0" encoding="utf-8"?>
+<p:sld xmlns:a="http://schemas.openxmlformats.org/drawingml/2006/main" xmlns:r="http://schemas.openxmlformats.org/officeDocument/2006/relationships" xmlns:p="http://schemas.openxmlformats.org/presentationml/2006/main">
+  <p:cSld>
+    <p:spTree>
+      <p:nvGrpSpPr>
+        <p:cNvPr id="1" name=""/>
+        <p:cNvGrpSpPr/>
+        <p:nvPr/>
+      </p:nvGrpSpPr>
+      <p:grpSpPr>
+        <a:xfrm>
+          <a:off x="0" y="0"/>
+          <a:ext cx="0" cy="0"/>
+          <a:chOff x="0" y="0"/>
+          <a:chExt cx="0" cy="0"/>
+        </a:xfrm>
+      </p:grpSpPr>
+      <p:pic>
+        <p:nvPicPr>
+          <p:cNvPr id="3" name="Picture 2">
+            <a:extLst>
+              <a:ext uri="{FF2B5EF4-FFF2-40B4-BE49-F238E27FC236}">
+                <a16:creationId xmlns:a16="http://schemas.microsoft.com/office/drawing/2014/main" id="{4CFFA8E4-8B71-4B87-8B7F-1DEE1A4746F5}"/>
+              </a:ext>
+            </a:extLst>
+          </p:cNvPr>
+          <p:cNvPicPr>
+            <a:picLocks noChangeAspect="1"/>
+          </p:cNvPicPr>
+          <p:nvPr/>
+        </p:nvPicPr>
+        <p:blipFill>
+          <a:blip r:embed="rId2"/>
+          <a:stretch>
+            <a:fillRect/>
+          </a:stretch>
+        </p:blipFill>
+        <p:spPr>
+          <a:xfrm>
+            <a:off x="4054" y="243559"/>
+            <a:ext cx="12183890" cy="6370881"/>
+          </a:xfrm>
+          <a:prstGeom prst="rect">
+            <a:avLst/>
+          </a:prstGeom>
+        </p:spPr>
+      </p:pic>
+    </p:spTree>
+    <p:extLst>
+      <p:ext uri="{BB962C8B-B14F-4D97-AF65-F5344CB8AC3E}">
+        <p14:creationId xmlns:p14="http://schemas.microsoft.com/office/powerpoint/2010/main" val="3709381565"/>
+      </p:ext>
+    </p:extLst>
+  </p:cSld>
+  <p:clrMapOvr>
+    <a:masterClrMapping/>
+  </p:clrMapOvr>
+</p:sld>
+</file>
+
+<file path=ppt/slides/slide15.xml><?xml version="1.0" encoding="utf-8"?>
+<p:sld xmlns:a="http://schemas.openxmlformats.org/drawingml/2006/main" xmlns:r="http://schemas.openxmlformats.org/officeDocument/2006/relationships" xmlns:p="http://schemas.openxmlformats.org/presentationml/2006/main">
+  <p:cSld>
+    <p:spTree>
+      <p:nvGrpSpPr>
+        <p:cNvPr id="1" name=""/>
+        <p:cNvGrpSpPr/>
+        <p:nvPr/>
+      </p:nvGrpSpPr>
+      <p:grpSpPr>
+        <a:xfrm>
+          <a:off x="0" y="0"/>
+          <a:ext cx="0" cy="0"/>
+          <a:chOff x="0" y="0"/>
+          <a:chExt cx="0" cy="0"/>
+        </a:xfrm>
+      </p:grpSpPr>
+      <p:pic>
+        <p:nvPicPr>
+          <p:cNvPr id="3" name="Picture 2">
+            <a:extLst>
+              <a:ext uri="{FF2B5EF4-FFF2-40B4-BE49-F238E27FC236}">
+                <a16:creationId xmlns:a16="http://schemas.microsoft.com/office/drawing/2014/main" id="{8920D74A-1B48-4388-A2EC-688BDAC28ED4}"/>
+              </a:ext>
+            </a:extLst>
+          </p:cNvPr>
+          <p:cNvPicPr>
+            <a:picLocks noChangeAspect="1"/>
+          </p:cNvPicPr>
+          <p:nvPr/>
+        </p:nvPicPr>
+        <p:blipFill>
+          <a:blip r:embed="rId2"/>
+          <a:stretch>
+            <a:fillRect/>
+          </a:stretch>
+        </p:blipFill>
+        <p:spPr>
+          <a:xfrm>
+            <a:off x="0" y="0"/>
+            <a:ext cx="5799323" cy="4907705"/>
+          </a:xfrm>
+          <a:prstGeom prst="rect">
+            <a:avLst/>
+          </a:prstGeom>
+        </p:spPr>
+      </p:pic>
+      <p:pic>
+        <p:nvPicPr>
+          <p:cNvPr id="5" name="Picture 4">
+            <a:extLst>
+              <a:ext uri="{FF2B5EF4-FFF2-40B4-BE49-F238E27FC236}">
+                <a16:creationId xmlns:a16="http://schemas.microsoft.com/office/drawing/2014/main" id="{AF0B14FE-1B14-499E-A631-DB2165C1D91E}"/>
+              </a:ext>
+            </a:extLst>
+          </p:cNvPr>
+          <p:cNvPicPr>
+            <a:picLocks noChangeAspect="1"/>
+          </p:cNvPicPr>
+          <p:nvPr/>
+        </p:nvPicPr>
+        <p:blipFill>
+          <a:blip r:embed="rId3"/>
+          <a:stretch>
+            <a:fillRect/>
+          </a:stretch>
+        </p:blipFill>
+        <p:spPr>
+          <a:xfrm>
+            <a:off x="4715734" y="2296459"/>
+            <a:ext cx="6927180" cy="4244708"/>
+          </a:xfrm>
+          <a:prstGeom prst="rect">
+            <a:avLst/>
+          </a:prstGeom>
+        </p:spPr>
+      </p:pic>
+    </p:spTree>
+    <p:extLst>
+      <p:ext uri="{BB962C8B-B14F-4D97-AF65-F5344CB8AC3E}">
+        <p14:creationId xmlns:p14="http://schemas.microsoft.com/office/powerpoint/2010/main" val="1520566158"/>
+      </p:ext>
+    </p:extLst>
+  </p:cSld>
+  <p:clrMapOvr>
+    <a:masterClrMapping/>
+  </p:clrMapOvr>
+</p:sld>
+</file>
+
+<file path=ppt/slides/slide16.xml><?xml version="1.0" encoding="utf-8"?>
+<p:sld xmlns:a="http://schemas.openxmlformats.org/drawingml/2006/main" xmlns:r="http://schemas.openxmlformats.org/officeDocument/2006/relationships" xmlns:p="http://schemas.openxmlformats.org/presentationml/2006/main">
+  <p:cSld>
+    <p:spTree>
+      <p:nvGrpSpPr>
+        <p:cNvPr id="1" name=""/>
+        <p:cNvGrpSpPr/>
+        <p:nvPr/>
+      </p:nvGrpSpPr>
+      <p:grpSpPr>
+        <a:xfrm>
+          <a:off x="0" y="0"/>
+          <a:ext cx="0" cy="0"/>
+          <a:chOff x="0" y="0"/>
+          <a:chExt cx="0" cy="0"/>
+        </a:xfrm>
+      </p:grpSpPr>
+      <p:pic>
+        <p:nvPicPr>
+          <p:cNvPr id="3" name="Picture 2">
+            <a:extLst>
+              <a:ext uri="{FF2B5EF4-FFF2-40B4-BE49-F238E27FC236}">
+                <a16:creationId xmlns:a16="http://schemas.microsoft.com/office/drawing/2014/main" id="{1D5EC766-9484-49D0-AF4F-0DD9E410CE06}"/>
+              </a:ext>
+            </a:extLst>
+          </p:cNvPr>
+          <p:cNvPicPr>
+            <a:picLocks noChangeAspect="1"/>
+          </p:cNvPicPr>
+          <p:nvPr/>
+        </p:nvPicPr>
+        <p:blipFill>
+          <a:blip r:embed="rId2"/>
+          <a:stretch>
+            <a:fillRect/>
+          </a:stretch>
+        </p:blipFill>
+        <p:spPr>
+          <a:xfrm>
+            <a:off x="2592021" y="25613"/>
+            <a:ext cx="7007959" cy="6806774"/>
+          </a:xfrm>
+          <a:prstGeom prst="rect">
+            <a:avLst/>
+          </a:prstGeom>
+        </p:spPr>
+      </p:pic>
+    </p:spTree>
+    <p:extLst>
+      <p:ext uri="{BB962C8B-B14F-4D97-AF65-F5344CB8AC3E}">
+        <p14:creationId xmlns:p14="http://schemas.microsoft.com/office/powerpoint/2010/main" val="1421375475"/>
+      </p:ext>
+    </p:extLst>
+  </p:cSld>
+  <p:clrMapOvr>
+    <a:masterClrMapping/>
+  </p:clrMapOvr>
+</p:sld>
+</file>
+
+<file path=ppt/slides/slide17.xml><?xml version="1.0" encoding="utf-8"?>
+<p:sld xmlns:a="http://schemas.openxmlformats.org/drawingml/2006/main" xmlns:r="http://schemas.openxmlformats.org/officeDocument/2006/relationships" xmlns:p="http://schemas.openxmlformats.org/presentationml/2006/main">
+  <p:cSld>
+    <p:spTree>
+      <p:nvGrpSpPr>
+        <p:cNvPr id="1" name=""/>
+        <p:cNvGrpSpPr/>
+        <p:nvPr/>
+      </p:nvGrpSpPr>
+      <p:grpSpPr>
+        <a:xfrm>
+          <a:off x="0" y="0"/>
+          <a:ext cx="0" cy="0"/>
+          <a:chOff x="0" y="0"/>
+          <a:chExt cx="0" cy="0"/>
+        </a:xfrm>
+      </p:grpSpPr>
       <p:sp>
         <p:nvSpPr>
-          <p:cNvPr id="3" name="Subtitle 2">
-            <a:extLst>
-              <a:ext uri="{FF2B5EF4-FFF2-40B4-BE49-F238E27FC236}">
-                <a16:creationId xmlns:a16="http://schemas.microsoft.com/office/drawing/2014/main" id="{10386EB2-06BF-4F71-917E-22B6BC9AA0E7}"/>
+          <p:cNvPr id="2" name="Title 1">
+            <a:extLst>
+              <a:ext uri="{FF2B5EF4-FFF2-40B4-BE49-F238E27FC236}">
+                <a16:creationId xmlns:a16="http://schemas.microsoft.com/office/drawing/2014/main" id="{10308D6A-6718-4449-9747-B43AD3EB83A3}"/>
               </a:ext>
             </a:extLst>
           </p:cNvPr>
@@ -3380,7 +4075,7 @@
             <a:spLocks noGrp="1"/>
           </p:cNvSpPr>
           <p:nvPr>
-            <p:ph type="subTitle" idx="1"/>
+            <p:ph type="title"/>
           </p:nvPr>
         </p:nvSpPr>
         <p:spPr/>
@@ -3388,14 +4083,2153 @@
           <a:bodyPr/>
           <a:lstStyle/>
           <a:p>
-            <a:endParaRPr lang="en-IN"/>
+            <a:r>
+              <a:rPr lang="en-IN" dirty="0" err="1"/>
+              <a:t>Kaam</a:t>
+            </a:r>
+            <a:r>
+              <a:rPr lang="en-IN" dirty="0"/>
+              <a:t> </a:t>
+            </a:r>
+            <a:r>
+              <a:rPr lang="en-IN" dirty="0" err="1"/>
+              <a:t>abhi</a:t>
+            </a:r>
+            <a:r>
+              <a:rPr lang="en-IN" dirty="0"/>
+              <a:t> </a:t>
+            </a:r>
+            <a:r>
+              <a:rPr lang="en-IN" dirty="0" err="1"/>
+              <a:t>chal</a:t>
+            </a:r>
+            <a:r>
+              <a:rPr lang="en-IN" dirty="0"/>
+              <a:t> </a:t>
+            </a:r>
+            <a:r>
+              <a:rPr lang="en-IN" dirty="0" err="1"/>
+              <a:t>rha</a:t>
+            </a:r>
+            <a:r>
+              <a:rPr lang="en-IN" dirty="0"/>
+              <a:t> </a:t>
+            </a:r>
+            <a:r>
+              <a:rPr lang="en-IN" dirty="0" err="1"/>
+              <a:t>hai</a:t>
+            </a:r>
+            <a:endParaRPr lang="en-IN" dirty="0"/>
           </a:p>
         </p:txBody>
       </p:sp>
     </p:spTree>
     <p:extLst>
       <p:ext uri="{BB962C8B-B14F-4D97-AF65-F5344CB8AC3E}">
-        <p14:creationId xmlns:p14="http://schemas.microsoft.com/office/powerpoint/2010/main" val="4053969307"/>
+        <p14:creationId xmlns:p14="http://schemas.microsoft.com/office/powerpoint/2010/main" val="1407644457"/>
+      </p:ext>
+    </p:extLst>
+  </p:cSld>
+  <p:clrMapOvr>
+    <a:masterClrMapping/>
+  </p:clrMapOvr>
+</p:sld>
+</file>
+
+<file path=ppt/slides/slide18.xml><?xml version="1.0" encoding="utf-8"?>
+<p:sld xmlns:a="http://schemas.openxmlformats.org/drawingml/2006/main" xmlns:r="http://schemas.openxmlformats.org/officeDocument/2006/relationships" xmlns:p="http://schemas.openxmlformats.org/presentationml/2006/main">
+  <p:cSld>
+    <p:spTree>
+      <p:nvGrpSpPr>
+        <p:cNvPr id="1" name=""/>
+        <p:cNvGrpSpPr/>
+        <p:nvPr/>
+      </p:nvGrpSpPr>
+      <p:grpSpPr>
+        <a:xfrm>
+          <a:off x="0" y="0"/>
+          <a:ext cx="0" cy="0"/>
+          <a:chOff x="0" y="0"/>
+          <a:chExt cx="0" cy="0"/>
+        </a:xfrm>
+      </p:grpSpPr>
+      <p:pic>
+        <p:nvPicPr>
+          <p:cNvPr id="3" name="Picture 2">
+            <a:extLst>
+              <a:ext uri="{FF2B5EF4-FFF2-40B4-BE49-F238E27FC236}">
+                <a16:creationId xmlns:a16="http://schemas.microsoft.com/office/drawing/2014/main" id="{C3CEE81B-1FF4-4217-BA80-AB33C75BB537}"/>
+              </a:ext>
+            </a:extLst>
+          </p:cNvPr>
+          <p:cNvPicPr>
+            <a:picLocks noChangeAspect="1"/>
+          </p:cNvPicPr>
+          <p:nvPr/>
+        </p:nvPicPr>
+        <p:blipFill>
+          <a:blip r:embed="rId2"/>
+          <a:stretch>
+            <a:fillRect/>
+          </a:stretch>
+        </p:blipFill>
+        <p:spPr>
+          <a:xfrm>
+            <a:off x="441851" y="195125"/>
+            <a:ext cx="11308298" cy="2414225"/>
+          </a:xfrm>
+          <a:prstGeom prst="rect">
+            <a:avLst/>
+          </a:prstGeom>
+        </p:spPr>
+      </p:pic>
+      <p:pic>
+        <p:nvPicPr>
+          <p:cNvPr id="5" name="Picture 4">
+            <a:extLst>
+              <a:ext uri="{FF2B5EF4-FFF2-40B4-BE49-F238E27FC236}">
+                <a16:creationId xmlns:a16="http://schemas.microsoft.com/office/drawing/2014/main" id="{EB582155-FACA-499B-AA82-C3904845E6ED}"/>
+              </a:ext>
+            </a:extLst>
+          </p:cNvPr>
+          <p:cNvPicPr>
+            <a:picLocks noChangeAspect="1"/>
+          </p:cNvPicPr>
+          <p:nvPr/>
+        </p:nvPicPr>
+        <p:blipFill>
+          <a:blip r:embed="rId3"/>
+          <a:stretch>
+            <a:fillRect/>
+          </a:stretch>
+        </p:blipFill>
+        <p:spPr>
+          <a:xfrm>
+            <a:off x="1516391" y="3804125"/>
+            <a:ext cx="9159218" cy="2190910"/>
+          </a:xfrm>
+          <a:prstGeom prst="rect">
+            <a:avLst/>
+          </a:prstGeom>
+        </p:spPr>
+      </p:pic>
+    </p:spTree>
+    <p:extLst>
+      <p:ext uri="{BB962C8B-B14F-4D97-AF65-F5344CB8AC3E}">
+        <p14:creationId xmlns:p14="http://schemas.microsoft.com/office/powerpoint/2010/main" val="3430783016"/>
+      </p:ext>
+    </p:extLst>
+  </p:cSld>
+  <p:clrMapOvr>
+    <a:masterClrMapping/>
+  </p:clrMapOvr>
+</p:sld>
+</file>
+
+<file path=ppt/slides/slide19.xml><?xml version="1.0" encoding="utf-8"?>
+<p:sld xmlns:a="http://schemas.openxmlformats.org/drawingml/2006/main" xmlns:r="http://schemas.openxmlformats.org/officeDocument/2006/relationships" xmlns:p="http://schemas.openxmlformats.org/presentationml/2006/main">
+  <p:cSld>
+    <p:spTree>
+      <p:nvGrpSpPr>
+        <p:cNvPr id="1" name=""/>
+        <p:cNvGrpSpPr/>
+        <p:nvPr/>
+      </p:nvGrpSpPr>
+      <p:grpSpPr>
+        <a:xfrm>
+          <a:off x="0" y="0"/>
+          <a:ext cx="0" cy="0"/>
+          <a:chOff x="0" y="0"/>
+          <a:chExt cx="0" cy="0"/>
+        </a:xfrm>
+      </p:grpSpPr>
+      <p:pic>
+        <p:nvPicPr>
+          <p:cNvPr id="3" name="Picture 2">
+            <a:extLst>
+              <a:ext uri="{FF2B5EF4-FFF2-40B4-BE49-F238E27FC236}">
+                <a16:creationId xmlns:a16="http://schemas.microsoft.com/office/drawing/2014/main" id="{9D419731-1EA8-409A-B1C2-DBB4DBA922EA}"/>
+              </a:ext>
+            </a:extLst>
+          </p:cNvPr>
+          <p:cNvPicPr>
+            <a:picLocks noChangeAspect="1"/>
+          </p:cNvPicPr>
+          <p:nvPr/>
+        </p:nvPicPr>
+        <p:blipFill>
+          <a:blip r:embed="rId2"/>
+          <a:stretch>
+            <a:fillRect/>
+          </a:stretch>
+        </p:blipFill>
+        <p:spPr>
+          <a:xfrm>
+            <a:off x="867232" y="122349"/>
+            <a:ext cx="10457535" cy="6613301"/>
+          </a:xfrm>
+          <a:prstGeom prst="rect">
+            <a:avLst/>
+          </a:prstGeom>
+        </p:spPr>
+      </p:pic>
+    </p:spTree>
+    <p:extLst>
+      <p:ext uri="{BB962C8B-B14F-4D97-AF65-F5344CB8AC3E}">
+        <p14:creationId xmlns:p14="http://schemas.microsoft.com/office/powerpoint/2010/main" val="3241873500"/>
+      </p:ext>
+    </p:extLst>
+  </p:cSld>
+  <p:clrMapOvr>
+    <a:masterClrMapping/>
+  </p:clrMapOvr>
+</p:sld>
+</file>
+
+<file path=ppt/slides/slide2.xml><?xml version="1.0" encoding="utf-8"?>
+<p:sld xmlns:a="http://schemas.openxmlformats.org/drawingml/2006/main" xmlns:r="http://schemas.openxmlformats.org/officeDocument/2006/relationships" xmlns:p="http://schemas.openxmlformats.org/presentationml/2006/main">
+  <p:cSld>
+    <p:spTree>
+      <p:nvGrpSpPr>
+        <p:cNvPr id="1" name=""/>
+        <p:cNvGrpSpPr/>
+        <p:nvPr/>
+      </p:nvGrpSpPr>
+      <p:grpSpPr>
+        <a:xfrm>
+          <a:off x="0" y="0"/>
+          <a:ext cx="0" cy="0"/>
+          <a:chOff x="0" y="0"/>
+          <a:chExt cx="0" cy="0"/>
+        </a:xfrm>
+      </p:grpSpPr>
+      <p:pic>
+        <p:nvPicPr>
+          <p:cNvPr id="3" name="Picture 2">
+            <a:extLst>
+              <a:ext uri="{FF2B5EF4-FFF2-40B4-BE49-F238E27FC236}">
+                <a16:creationId xmlns:a16="http://schemas.microsoft.com/office/drawing/2014/main" id="{F25B9D7B-9481-4DD6-8995-B384CF359BCD}"/>
+              </a:ext>
+            </a:extLst>
+          </p:cNvPr>
+          <p:cNvPicPr>
+            <a:picLocks noChangeAspect="1"/>
+          </p:cNvPicPr>
+          <p:nvPr/>
+        </p:nvPicPr>
+        <p:blipFill>
+          <a:blip r:embed="rId2"/>
+          <a:stretch>
+            <a:fillRect/>
+          </a:stretch>
+        </p:blipFill>
+        <p:spPr>
+          <a:xfrm>
+            <a:off x="0" y="0"/>
+            <a:ext cx="12192000" cy="2702977"/>
+          </a:xfrm>
+          <a:prstGeom prst="rect">
+            <a:avLst/>
+          </a:prstGeom>
+        </p:spPr>
+      </p:pic>
+      <p:pic>
+        <p:nvPicPr>
+          <p:cNvPr id="5" name="Picture 4">
+            <a:extLst>
+              <a:ext uri="{FF2B5EF4-FFF2-40B4-BE49-F238E27FC236}">
+                <a16:creationId xmlns:a16="http://schemas.microsoft.com/office/drawing/2014/main" id="{E9A6A58F-49CF-4933-B937-97585B98929C}"/>
+              </a:ext>
+            </a:extLst>
+          </p:cNvPr>
+          <p:cNvPicPr>
+            <a:picLocks noChangeAspect="1"/>
+          </p:cNvPicPr>
+          <p:nvPr/>
+        </p:nvPicPr>
+        <p:blipFill>
+          <a:blip r:embed="rId3"/>
+          <a:stretch>
+            <a:fillRect/>
+          </a:stretch>
+        </p:blipFill>
+        <p:spPr>
+          <a:xfrm>
+            <a:off x="0" y="3429000"/>
+            <a:ext cx="12192000" cy="2534411"/>
+          </a:xfrm>
+          <a:prstGeom prst="rect">
+            <a:avLst/>
+          </a:prstGeom>
+        </p:spPr>
+      </p:pic>
+    </p:spTree>
+    <p:extLst>
+      <p:ext uri="{BB962C8B-B14F-4D97-AF65-F5344CB8AC3E}">
+        <p14:creationId xmlns:p14="http://schemas.microsoft.com/office/powerpoint/2010/main" val="2802360877"/>
+      </p:ext>
+    </p:extLst>
+  </p:cSld>
+  <p:clrMapOvr>
+    <a:masterClrMapping/>
+  </p:clrMapOvr>
+</p:sld>
+</file>
+
+<file path=ppt/slides/slide20.xml><?xml version="1.0" encoding="utf-8"?>
+<p:sld xmlns:a="http://schemas.openxmlformats.org/drawingml/2006/main" xmlns:r="http://schemas.openxmlformats.org/officeDocument/2006/relationships" xmlns:p="http://schemas.openxmlformats.org/presentationml/2006/main">
+  <p:cSld>
+    <p:spTree>
+      <p:nvGrpSpPr>
+        <p:cNvPr id="1" name=""/>
+        <p:cNvGrpSpPr/>
+        <p:nvPr/>
+      </p:nvGrpSpPr>
+      <p:grpSpPr>
+        <a:xfrm>
+          <a:off x="0" y="0"/>
+          <a:ext cx="0" cy="0"/>
+          <a:chOff x="0" y="0"/>
+          <a:chExt cx="0" cy="0"/>
+        </a:xfrm>
+      </p:grpSpPr>
+      <p:pic>
+        <p:nvPicPr>
+          <p:cNvPr id="3" name="Picture 2">
+            <a:extLst>
+              <a:ext uri="{FF2B5EF4-FFF2-40B4-BE49-F238E27FC236}">
+                <a16:creationId xmlns:a16="http://schemas.microsoft.com/office/drawing/2014/main" id="{081F2215-4D41-4FBA-B3CD-ED29C0852CB5}"/>
+              </a:ext>
+            </a:extLst>
+          </p:cNvPr>
+          <p:cNvPicPr>
+            <a:picLocks noChangeAspect="1"/>
+          </p:cNvPicPr>
+          <p:nvPr/>
+        </p:nvPicPr>
+        <p:blipFill>
+          <a:blip r:embed="rId2"/>
+          <a:stretch>
+            <a:fillRect/>
+          </a:stretch>
+        </p:blipFill>
+        <p:spPr>
+          <a:xfrm>
+            <a:off x="319043" y="948550"/>
+            <a:ext cx="11553912" cy="4960898"/>
+          </a:xfrm>
+          <a:prstGeom prst="rect">
+            <a:avLst/>
+          </a:prstGeom>
+        </p:spPr>
+      </p:pic>
+    </p:spTree>
+    <p:extLst>
+      <p:ext uri="{BB962C8B-B14F-4D97-AF65-F5344CB8AC3E}">
+        <p14:creationId xmlns:p14="http://schemas.microsoft.com/office/powerpoint/2010/main" val="1019939339"/>
+      </p:ext>
+    </p:extLst>
+  </p:cSld>
+  <p:clrMapOvr>
+    <a:masterClrMapping/>
+  </p:clrMapOvr>
+</p:sld>
+</file>
+
+<file path=ppt/slides/slide21.xml><?xml version="1.0" encoding="utf-8"?>
+<p:sld xmlns:a="http://schemas.openxmlformats.org/drawingml/2006/main" xmlns:r="http://schemas.openxmlformats.org/officeDocument/2006/relationships" xmlns:p="http://schemas.openxmlformats.org/presentationml/2006/main">
+  <p:cSld>
+    <p:spTree>
+      <p:nvGrpSpPr>
+        <p:cNvPr id="1" name=""/>
+        <p:cNvGrpSpPr/>
+        <p:nvPr/>
+      </p:nvGrpSpPr>
+      <p:grpSpPr>
+        <a:xfrm>
+          <a:off x="0" y="0"/>
+          <a:ext cx="0" cy="0"/>
+          <a:chOff x="0" y="0"/>
+          <a:chExt cx="0" cy="0"/>
+        </a:xfrm>
+      </p:grpSpPr>
+      <p:pic>
+        <p:nvPicPr>
+          <p:cNvPr id="3" name="Picture 2">
+            <a:extLst>
+              <a:ext uri="{FF2B5EF4-FFF2-40B4-BE49-F238E27FC236}">
+                <a16:creationId xmlns:a16="http://schemas.microsoft.com/office/drawing/2014/main" id="{625CC09B-5E22-4CC0-BAD4-F5E3C065890C}"/>
+              </a:ext>
+            </a:extLst>
+          </p:cNvPr>
+          <p:cNvPicPr>
+            <a:picLocks noChangeAspect="1"/>
+          </p:cNvPicPr>
+          <p:nvPr/>
+        </p:nvPicPr>
+        <p:blipFill>
+          <a:blip r:embed="rId2"/>
+          <a:stretch>
+            <a:fillRect/>
+          </a:stretch>
+        </p:blipFill>
+        <p:spPr>
+          <a:xfrm>
+            <a:off x="0" y="0"/>
+            <a:ext cx="11325063" cy="4375784"/>
+          </a:xfrm>
+          <a:prstGeom prst="rect">
+            <a:avLst/>
+          </a:prstGeom>
+        </p:spPr>
+      </p:pic>
+      <p:pic>
+        <p:nvPicPr>
+          <p:cNvPr id="3074" name="Picture 2">
+            <a:extLst>
+              <a:ext uri="{FF2B5EF4-FFF2-40B4-BE49-F238E27FC236}">
+                <a16:creationId xmlns:a16="http://schemas.microsoft.com/office/drawing/2014/main" id="{D192ED25-C447-48A6-BDF8-3C192D870230}"/>
+              </a:ext>
+            </a:extLst>
+          </p:cNvPr>
+          <p:cNvPicPr>
+            <a:picLocks noChangeAspect="1" noChangeArrowheads="1"/>
+          </p:cNvPicPr>
+          <p:nvPr/>
+        </p:nvPicPr>
+        <p:blipFill>
+          <a:blip r:embed="rId3">
+            <a:extLst>
+              <a:ext uri="{28A0092B-C50C-407E-A947-70E740481C1C}">
+                <a14:useLocalDpi xmlns:a14="http://schemas.microsoft.com/office/drawing/2010/main" val="0"/>
+              </a:ext>
+            </a:extLst>
+          </a:blip>
+          <a:srcRect/>
+          <a:stretch>
+            <a:fillRect/>
+          </a:stretch>
+        </p:blipFill>
+        <p:spPr bwMode="auto">
+          <a:xfrm>
+            <a:off x="4385419" y="2449530"/>
+            <a:ext cx="7606665" cy="4183666"/>
+          </a:xfrm>
+          <a:prstGeom prst="rect">
+            <a:avLst/>
+          </a:prstGeom>
+          <a:noFill/>
+          <a:extLst>
+            <a:ext uri="{909E8E84-426E-40DD-AFC4-6F175D3DCCD1}">
+              <a14:hiddenFill xmlns:a14="http://schemas.microsoft.com/office/drawing/2010/main">
+                <a:solidFill>
+                  <a:srgbClr val="FFFFFF"/>
+                </a:solidFill>
+              </a14:hiddenFill>
+            </a:ext>
+          </a:extLst>
+        </p:spPr>
+      </p:pic>
+    </p:spTree>
+    <p:extLst>
+      <p:ext uri="{BB962C8B-B14F-4D97-AF65-F5344CB8AC3E}">
+        <p14:creationId xmlns:p14="http://schemas.microsoft.com/office/powerpoint/2010/main" val="2297379065"/>
+      </p:ext>
+    </p:extLst>
+  </p:cSld>
+  <p:clrMapOvr>
+    <a:masterClrMapping/>
+  </p:clrMapOvr>
+</p:sld>
+</file>
+
+<file path=ppt/slides/slide22.xml><?xml version="1.0" encoding="utf-8"?>
+<p:sld xmlns:a="http://schemas.openxmlformats.org/drawingml/2006/main" xmlns:r="http://schemas.openxmlformats.org/officeDocument/2006/relationships" xmlns:p="http://schemas.openxmlformats.org/presentationml/2006/main">
+  <p:cSld>
+    <p:spTree>
+      <p:nvGrpSpPr>
+        <p:cNvPr id="1" name=""/>
+        <p:cNvGrpSpPr/>
+        <p:nvPr/>
+      </p:nvGrpSpPr>
+      <p:grpSpPr>
+        <a:xfrm>
+          <a:off x="0" y="0"/>
+          <a:ext cx="0" cy="0"/>
+          <a:chOff x="0" y="0"/>
+          <a:chExt cx="0" cy="0"/>
+        </a:xfrm>
+      </p:grpSpPr>
+      <p:pic>
+        <p:nvPicPr>
+          <p:cNvPr id="4098" name="Picture 2">
+            <a:extLst>
+              <a:ext uri="{FF2B5EF4-FFF2-40B4-BE49-F238E27FC236}">
+                <a16:creationId xmlns:a16="http://schemas.microsoft.com/office/drawing/2014/main" id="{0B2DF4EE-939E-4E49-8282-6193B350A45D}"/>
+              </a:ext>
+            </a:extLst>
+          </p:cNvPr>
+          <p:cNvPicPr>
+            <a:picLocks noChangeAspect="1" noChangeArrowheads="1"/>
+          </p:cNvPicPr>
+          <p:nvPr/>
+        </p:nvPicPr>
+        <p:blipFill>
+          <a:blip r:embed="rId2">
+            <a:extLst>
+              <a:ext uri="{28A0092B-C50C-407E-A947-70E740481C1C}">
+                <a14:useLocalDpi xmlns:a14="http://schemas.microsoft.com/office/drawing/2010/main" val="0"/>
+              </a:ext>
+            </a:extLst>
+          </a:blip>
+          <a:srcRect/>
+          <a:stretch>
+            <a:fillRect/>
+          </a:stretch>
+        </p:blipFill>
+        <p:spPr bwMode="auto">
+          <a:xfrm>
+            <a:off x="381000" y="283836"/>
+            <a:ext cx="5715000" cy="2085975"/>
+          </a:xfrm>
+          <a:prstGeom prst="rect">
+            <a:avLst/>
+          </a:prstGeom>
+          <a:noFill/>
+          <a:extLst>
+            <a:ext uri="{909E8E84-426E-40DD-AFC4-6F175D3DCCD1}">
+              <a14:hiddenFill xmlns:a14="http://schemas.microsoft.com/office/drawing/2010/main">
+                <a:solidFill>
+                  <a:srgbClr val="FFFFFF"/>
+                </a:solidFill>
+              </a14:hiddenFill>
+            </a:ext>
+          </a:extLst>
+        </p:spPr>
+      </p:pic>
+      <p:pic>
+        <p:nvPicPr>
+          <p:cNvPr id="4100" name="Picture 4">
+            <a:extLst>
+              <a:ext uri="{FF2B5EF4-FFF2-40B4-BE49-F238E27FC236}">
+                <a16:creationId xmlns:a16="http://schemas.microsoft.com/office/drawing/2014/main" id="{E684E9AF-3C3B-4383-B71E-F5275DF6C1DE}"/>
+              </a:ext>
+            </a:extLst>
+          </p:cNvPr>
+          <p:cNvPicPr>
+            <a:picLocks noChangeAspect="1" noChangeArrowheads="1"/>
+          </p:cNvPicPr>
+          <p:nvPr/>
+        </p:nvPicPr>
+        <p:blipFill>
+          <a:blip r:embed="rId3">
+            <a:extLst>
+              <a:ext uri="{28A0092B-C50C-407E-A947-70E740481C1C}">
+                <a14:useLocalDpi xmlns:a14="http://schemas.microsoft.com/office/drawing/2010/main" val="0"/>
+              </a:ext>
+            </a:extLst>
+          </a:blip>
+          <a:srcRect/>
+          <a:stretch>
+            <a:fillRect/>
+          </a:stretch>
+        </p:blipFill>
+        <p:spPr bwMode="auto">
+          <a:xfrm>
+            <a:off x="381000" y="3030864"/>
+            <a:ext cx="5715000" cy="3543300"/>
+          </a:xfrm>
+          <a:prstGeom prst="rect">
+            <a:avLst/>
+          </a:prstGeom>
+          <a:noFill/>
+          <a:extLst>
+            <a:ext uri="{909E8E84-426E-40DD-AFC4-6F175D3DCCD1}">
+              <a14:hiddenFill xmlns:a14="http://schemas.microsoft.com/office/drawing/2010/main">
+                <a:solidFill>
+                  <a:srgbClr val="FFFFFF"/>
+                </a:solidFill>
+              </a14:hiddenFill>
+            </a:ext>
+          </a:extLst>
+        </p:spPr>
+      </p:pic>
+      <p:pic>
+        <p:nvPicPr>
+          <p:cNvPr id="4102" name="Picture 6">
+            <a:extLst>
+              <a:ext uri="{FF2B5EF4-FFF2-40B4-BE49-F238E27FC236}">
+                <a16:creationId xmlns:a16="http://schemas.microsoft.com/office/drawing/2014/main" id="{7424927F-D12F-4792-B46A-1819DB144817}"/>
+              </a:ext>
+            </a:extLst>
+          </p:cNvPr>
+          <p:cNvPicPr>
+            <a:picLocks noChangeAspect="1" noChangeArrowheads="1"/>
+          </p:cNvPicPr>
+          <p:nvPr/>
+        </p:nvPicPr>
+        <p:blipFill>
+          <a:blip r:embed="rId4">
+            <a:extLst>
+              <a:ext uri="{28A0092B-C50C-407E-A947-70E740481C1C}">
+                <a14:useLocalDpi xmlns:a14="http://schemas.microsoft.com/office/drawing/2010/main" val="0"/>
+              </a:ext>
+            </a:extLst>
+          </a:blip>
+          <a:srcRect/>
+          <a:stretch>
+            <a:fillRect/>
+          </a:stretch>
+        </p:blipFill>
+        <p:spPr bwMode="auto">
+          <a:xfrm>
+            <a:off x="6877050" y="0"/>
+            <a:ext cx="4933950" cy="6858000"/>
+          </a:xfrm>
+          <a:prstGeom prst="rect">
+            <a:avLst/>
+          </a:prstGeom>
+          <a:noFill/>
+          <a:extLst>
+            <a:ext uri="{909E8E84-426E-40DD-AFC4-6F175D3DCCD1}">
+              <a14:hiddenFill xmlns:a14="http://schemas.microsoft.com/office/drawing/2010/main">
+                <a:solidFill>
+                  <a:srgbClr val="FFFFFF"/>
+                </a:solidFill>
+              </a14:hiddenFill>
+            </a:ext>
+          </a:extLst>
+        </p:spPr>
+      </p:pic>
+      <p:pic>
+        <p:nvPicPr>
+          <p:cNvPr id="3" name="Picture 2">
+            <a:extLst>
+              <a:ext uri="{FF2B5EF4-FFF2-40B4-BE49-F238E27FC236}">
+                <a16:creationId xmlns:a16="http://schemas.microsoft.com/office/drawing/2014/main" id="{ECB5DD92-FB2F-4D5A-A1B3-691C3EC16B83}"/>
+              </a:ext>
+            </a:extLst>
+          </p:cNvPr>
+          <p:cNvPicPr>
+            <a:picLocks noChangeAspect="1"/>
+          </p:cNvPicPr>
+          <p:nvPr/>
+        </p:nvPicPr>
+        <p:blipFill>
+          <a:blip r:embed="rId5"/>
+          <a:stretch>
+            <a:fillRect/>
+          </a:stretch>
+        </p:blipFill>
+        <p:spPr>
+          <a:xfrm>
+            <a:off x="192177" y="2247837"/>
+            <a:ext cx="6453223" cy="783027"/>
+          </a:xfrm>
+          <a:prstGeom prst="rect">
+            <a:avLst/>
+          </a:prstGeom>
+        </p:spPr>
+      </p:pic>
+    </p:spTree>
+    <p:extLst>
+      <p:ext uri="{BB962C8B-B14F-4D97-AF65-F5344CB8AC3E}">
+        <p14:creationId xmlns:p14="http://schemas.microsoft.com/office/powerpoint/2010/main" val="2744121769"/>
+      </p:ext>
+    </p:extLst>
+  </p:cSld>
+  <p:clrMapOvr>
+    <a:masterClrMapping/>
+  </p:clrMapOvr>
+</p:sld>
+</file>
+
+<file path=ppt/slides/slide23.xml><?xml version="1.0" encoding="utf-8"?>
+<p:sld xmlns:a="http://schemas.openxmlformats.org/drawingml/2006/main" xmlns:r="http://schemas.openxmlformats.org/officeDocument/2006/relationships" xmlns:p="http://schemas.openxmlformats.org/presentationml/2006/main">
+  <p:cSld>
+    <p:spTree>
+      <p:nvGrpSpPr>
+        <p:cNvPr id="1" name=""/>
+        <p:cNvGrpSpPr/>
+        <p:nvPr/>
+      </p:nvGrpSpPr>
+      <p:grpSpPr>
+        <a:xfrm>
+          <a:off x="0" y="0"/>
+          <a:ext cx="0" cy="0"/>
+          <a:chOff x="0" y="0"/>
+          <a:chExt cx="0" cy="0"/>
+        </a:xfrm>
+      </p:grpSpPr>
+      <p:pic>
+        <p:nvPicPr>
+          <p:cNvPr id="3" name="Picture 2">
+            <a:extLst>
+              <a:ext uri="{FF2B5EF4-FFF2-40B4-BE49-F238E27FC236}">
+                <a16:creationId xmlns:a16="http://schemas.microsoft.com/office/drawing/2014/main" id="{0F16BF4D-432B-4F9D-A6CD-2DF17DC65450}"/>
+              </a:ext>
+            </a:extLst>
+          </p:cNvPr>
+          <p:cNvPicPr>
+            <a:picLocks noChangeAspect="1"/>
+          </p:cNvPicPr>
+          <p:nvPr/>
+        </p:nvPicPr>
+        <p:blipFill>
+          <a:blip r:embed="rId2"/>
+          <a:stretch>
+            <a:fillRect/>
+          </a:stretch>
+        </p:blipFill>
+        <p:spPr>
+          <a:xfrm>
+            <a:off x="466999" y="229685"/>
+            <a:ext cx="11258002" cy="2439373"/>
+          </a:xfrm>
+          <a:prstGeom prst="rect">
+            <a:avLst/>
+          </a:prstGeom>
+        </p:spPr>
+      </p:pic>
+      <p:pic>
+        <p:nvPicPr>
+          <p:cNvPr id="5" name="Picture 4">
+            <a:extLst>
+              <a:ext uri="{FF2B5EF4-FFF2-40B4-BE49-F238E27FC236}">
+                <a16:creationId xmlns:a16="http://schemas.microsoft.com/office/drawing/2014/main" id="{4AF84C75-CE1E-42F7-871E-FC20BDCC7574}"/>
+              </a:ext>
+            </a:extLst>
+          </p:cNvPr>
+          <p:cNvPicPr>
+            <a:picLocks noChangeAspect="1"/>
+          </p:cNvPicPr>
+          <p:nvPr/>
+        </p:nvPicPr>
+        <p:blipFill>
+          <a:blip r:embed="rId3"/>
+          <a:stretch>
+            <a:fillRect/>
+          </a:stretch>
+        </p:blipFill>
+        <p:spPr>
+          <a:xfrm>
+            <a:off x="1394472" y="2669058"/>
+            <a:ext cx="9685859" cy="4099915"/>
+          </a:xfrm>
+          <a:prstGeom prst="rect">
+            <a:avLst/>
+          </a:prstGeom>
+        </p:spPr>
+      </p:pic>
+    </p:spTree>
+    <p:extLst>
+      <p:ext uri="{BB962C8B-B14F-4D97-AF65-F5344CB8AC3E}">
+        <p14:creationId xmlns:p14="http://schemas.microsoft.com/office/powerpoint/2010/main" val="3562916846"/>
+      </p:ext>
+    </p:extLst>
+  </p:cSld>
+  <p:clrMapOvr>
+    <a:masterClrMapping/>
+  </p:clrMapOvr>
+</p:sld>
+</file>
+
+<file path=ppt/slides/slide24.xml><?xml version="1.0" encoding="utf-8"?>
+<p:sld xmlns:a="http://schemas.openxmlformats.org/drawingml/2006/main" xmlns:r="http://schemas.openxmlformats.org/officeDocument/2006/relationships" xmlns:p="http://schemas.openxmlformats.org/presentationml/2006/main">
+  <p:cSld>
+    <p:spTree>
+      <p:nvGrpSpPr>
+        <p:cNvPr id="1" name=""/>
+        <p:cNvGrpSpPr/>
+        <p:nvPr/>
+      </p:nvGrpSpPr>
+      <p:grpSpPr>
+        <a:xfrm>
+          <a:off x="0" y="0"/>
+          <a:ext cx="0" cy="0"/>
+          <a:chOff x="0" y="0"/>
+          <a:chExt cx="0" cy="0"/>
+        </a:xfrm>
+      </p:grpSpPr>
+      <p:pic>
+        <p:nvPicPr>
+          <p:cNvPr id="3" name="Picture 2">
+            <a:extLst>
+              <a:ext uri="{FF2B5EF4-FFF2-40B4-BE49-F238E27FC236}">
+                <a16:creationId xmlns:a16="http://schemas.microsoft.com/office/drawing/2014/main" id="{EDBFDA7D-5FC6-4965-9E40-0DC94FD837E6}"/>
+              </a:ext>
+            </a:extLst>
+          </p:cNvPr>
+          <p:cNvPicPr>
+            <a:picLocks noChangeAspect="1"/>
+          </p:cNvPicPr>
+          <p:nvPr/>
+        </p:nvPicPr>
+        <p:blipFill>
+          <a:blip r:embed="rId2"/>
+          <a:stretch>
+            <a:fillRect/>
+          </a:stretch>
+        </p:blipFill>
+        <p:spPr>
+          <a:xfrm>
+            <a:off x="408320" y="1148898"/>
+            <a:ext cx="11375360" cy="4560203"/>
+          </a:xfrm>
+          <a:prstGeom prst="rect">
+            <a:avLst/>
+          </a:prstGeom>
+        </p:spPr>
+      </p:pic>
+    </p:spTree>
+    <p:extLst>
+      <p:ext uri="{BB962C8B-B14F-4D97-AF65-F5344CB8AC3E}">
+        <p14:creationId xmlns:p14="http://schemas.microsoft.com/office/powerpoint/2010/main" val="217737195"/>
+      </p:ext>
+    </p:extLst>
+  </p:cSld>
+  <p:clrMapOvr>
+    <a:masterClrMapping/>
+  </p:clrMapOvr>
+</p:sld>
+</file>
+
+<file path=ppt/slides/slide25.xml><?xml version="1.0" encoding="utf-8"?>
+<p:sld xmlns:a="http://schemas.openxmlformats.org/drawingml/2006/main" xmlns:r="http://schemas.openxmlformats.org/officeDocument/2006/relationships" xmlns:p="http://schemas.openxmlformats.org/presentationml/2006/main">
+  <p:cSld>
+    <p:spTree>
+      <p:nvGrpSpPr>
+        <p:cNvPr id="1" name=""/>
+        <p:cNvGrpSpPr/>
+        <p:nvPr/>
+      </p:nvGrpSpPr>
+      <p:grpSpPr>
+        <a:xfrm>
+          <a:off x="0" y="0"/>
+          <a:ext cx="0" cy="0"/>
+          <a:chOff x="0" y="0"/>
+          <a:chExt cx="0" cy="0"/>
+        </a:xfrm>
+      </p:grpSpPr>
+      <p:pic>
+        <p:nvPicPr>
+          <p:cNvPr id="3" name="Picture 2">
+            <a:extLst>
+              <a:ext uri="{FF2B5EF4-FFF2-40B4-BE49-F238E27FC236}">
+                <a16:creationId xmlns:a16="http://schemas.microsoft.com/office/drawing/2014/main" id="{1C017D59-E4AB-4556-B78F-B499D60D2069}"/>
+              </a:ext>
+            </a:extLst>
+          </p:cNvPr>
+          <p:cNvPicPr>
+            <a:picLocks noChangeAspect="1"/>
+          </p:cNvPicPr>
+          <p:nvPr/>
+        </p:nvPicPr>
+        <p:blipFill>
+          <a:blip r:embed="rId2"/>
+          <a:stretch>
+            <a:fillRect/>
+          </a:stretch>
+        </p:blipFill>
+        <p:spPr>
+          <a:xfrm>
+            <a:off x="345450" y="25613"/>
+            <a:ext cx="11501101" cy="6806774"/>
+          </a:xfrm>
+          <a:prstGeom prst="rect">
+            <a:avLst/>
+          </a:prstGeom>
+        </p:spPr>
+      </p:pic>
+    </p:spTree>
+    <p:extLst>
+      <p:ext uri="{BB962C8B-B14F-4D97-AF65-F5344CB8AC3E}">
+        <p14:creationId xmlns:p14="http://schemas.microsoft.com/office/powerpoint/2010/main" val="2895904503"/>
+      </p:ext>
+    </p:extLst>
+  </p:cSld>
+  <p:clrMapOvr>
+    <a:masterClrMapping/>
+  </p:clrMapOvr>
+</p:sld>
+</file>
+
+<file path=ppt/slides/slide26.xml><?xml version="1.0" encoding="utf-8"?>
+<p:sld xmlns:a="http://schemas.openxmlformats.org/drawingml/2006/main" xmlns:r="http://schemas.openxmlformats.org/officeDocument/2006/relationships" xmlns:p="http://schemas.openxmlformats.org/presentationml/2006/main">
+  <p:cSld>
+    <p:spTree>
+      <p:nvGrpSpPr>
+        <p:cNvPr id="1" name=""/>
+        <p:cNvGrpSpPr/>
+        <p:nvPr/>
+      </p:nvGrpSpPr>
+      <p:grpSpPr>
+        <a:xfrm>
+          <a:off x="0" y="0"/>
+          <a:ext cx="0" cy="0"/>
+          <a:chOff x="0" y="0"/>
+          <a:chExt cx="0" cy="0"/>
+        </a:xfrm>
+      </p:grpSpPr>
+      <p:pic>
+        <p:nvPicPr>
+          <p:cNvPr id="3" name="Picture 2">
+            <a:extLst>
+              <a:ext uri="{FF2B5EF4-FFF2-40B4-BE49-F238E27FC236}">
+                <a16:creationId xmlns:a16="http://schemas.microsoft.com/office/drawing/2014/main" id="{20B35C61-90E2-4CFE-954C-C50E62F8D998}"/>
+              </a:ext>
+            </a:extLst>
+          </p:cNvPr>
+          <p:cNvPicPr>
+            <a:picLocks noChangeAspect="1"/>
+          </p:cNvPicPr>
+          <p:nvPr/>
+        </p:nvPicPr>
+        <p:blipFill>
+          <a:blip r:embed="rId2"/>
+          <a:stretch>
+            <a:fillRect/>
+          </a:stretch>
+        </p:blipFill>
+        <p:spPr>
+          <a:xfrm>
+            <a:off x="349640" y="180694"/>
+            <a:ext cx="11492718" cy="6496613"/>
+          </a:xfrm>
+          <a:prstGeom prst="rect">
+            <a:avLst/>
+          </a:prstGeom>
+        </p:spPr>
+      </p:pic>
+    </p:spTree>
+    <p:extLst>
+      <p:ext uri="{BB962C8B-B14F-4D97-AF65-F5344CB8AC3E}">
+        <p14:creationId xmlns:p14="http://schemas.microsoft.com/office/powerpoint/2010/main" val="3850237797"/>
+      </p:ext>
+    </p:extLst>
+  </p:cSld>
+  <p:clrMapOvr>
+    <a:masterClrMapping/>
+  </p:clrMapOvr>
+</p:sld>
+</file>
+
+<file path=ppt/slides/slide27.xml><?xml version="1.0" encoding="utf-8"?>
+<p:sld xmlns:a="http://schemas.openxmlformats.org/drawingml/2006/main" xmlns:r="http://schemas.openxmlformats.org/officeDocument/2006/relationships" xmlns:p="http://schemas.openxmlformats.org/presentationml/2006/main">
+  <p:cSld>
+    <p:spTree>
+      <p:nvGrpSpPr>
+        <p:cNvPr id="1" name=""/>
+        <p:cNvGrpSpPr/>
+        <p:nvPr/>
+      </p:nvGrpSpPr>
+      <p:grpSpPr>
+        <a:xfrm>
+          <a:off x="0" y="0"/>
+          <a:ext cx="0" cy="0"/>
+          <a:chOff x="0" y="0"/>
+          <a:chExt cx="0" cy="0"/>
+        </a:xfrm>
+      </p:grpSpPr>
+      <p:pic>
+        <p:nvPicPr>
+          <p:cNvPr id="3" name="Picture 2">
+            <a:extLst>
+              <a:ext uri="{FF2B5EF4-FFF2-40B4-BE49-F238E27FC236}">
+                <a16:creationId xmlns:a16="http://schemas.microsoft.com/office/drawing/2014/main" id="{F8B28CCA-7CC3-4AE3-A0B1-B64C6DE3C96F}"/>
+              </a:ext>
+            </a:extLst>
+          </p:cNvPr>
+          <p:cNvPicPr>
+            <a:picLocks noChangeAspect="1"/>
+          </p:cNvPicPr>
+          <p:nvPr/>
+        </p:nvPicPr>
+        <p:blipFill>
+          <a:blip r:embed="rId2"/>
+          <a:stretch>
+            <a:fillRect/>
+          </a:stretch>
+        </p:blipFill>
+        <p:spPr>
+          <a:xfrm>
+            <a:off x="257431" y="256138"/>
+            <a:ext cx="11677138" cy="6345724"/>
+          </a:xfrm>
+          <a:prstGeom prst="rect">
+            <a:avLst/>
+          </a:prstGeom>
+        </p:spPr>
+      </p:pic>
+    </p:spTree>
+    <p:extLst>
+      <p:ext uri="{BB962C8B-B14F-4D97-AF65-F5344CB8AC3E}">
+        <p14:creationId xmlns:p14="http://schemas.microsoft.com/office/powerpoint/2010/main" val="1121304389"/>
+      </p:ext>
+    </p:extLst>
+  </p:cSld>
+  <p:clrMapOvr>
+    <a:masterClrMapping/>
+  </p:clrMapOvr>
+</p:sld>
+</file>
+
+<file path=ppt/slides/slide28.xml><?xml version="1.0" encoding="utf-8"?>
+<p:sld xmlns:a="http://schemas.openxmlformats.org/drawingml/2006/main" xmlns:r="http://schemas.openxmlformats.org/officeDocument/2006/relationships" xmlns:p="http://schemas.openxmlformats.org/presentationml/2006/main">
+  <p:cSld>
+    <p:spTree>
+      <p:nvGrpSpPr>
+        <p:cNvPr id="1" name=""/>
+        <p:cNvGrpSpPr/>
+        <p:nvPr/>
+      </p:nvGrpSpPr>
+      <p:grpSpPr>
+        <a:xfrm>
+          <a:off x="0" y="0"/>
+          <a:ext cx="0" cy="0"/>
+          <a:chOff x="0" y="0"/>
+          <a:chExt cx="0" cy="0"/>
+        </a:xfrm>
+      </p:grpSpPr>
+      <p:pic>
+        <p:nvPicPr>
+          <p:cNvPr id="5122" name="Picture 2">
+            <a:extLst>
+              <a:ext uri="{FF2B5EF4-FFF2-40B4-BE49-F238E27FC236}">
+                <a16:creationId xmlns:a16="http://schemas.microsoft.com/office/drawing/2014/main" id="{1EA65CF7-53C5-4C13-9019-300EFB3497A6}"/>
+              </a:ext>
+            </a:extLst>
+          </p:cNvPr>
+          <p:cNvPicPr>
+            <a:picLocks noChangeAspect="1" noChangeArrowheads="1"/>
+          </p:cNvPicPr>
+          <p:nvPr/>
+        </p:nvPicPr>
+        <p:blipFill>
+          <a:blip r:embed="rId2">
+            <a:extLst>
+              <a:ext uri="{28A0092B-C50C-407E-A947-70E740481C1C}">
+                <a14:useLocalDpi xmlns:a14="http://schemas.microsoft.com/office/drawing/2010/main" val="0"/>
+              </a:ext>
+            </a:extLst>
+          </a:blip>
+          <a:srcRect/>
+          <a:stretch>
+            <a:fillRect/>
+          </a:stretch>
+        </p:blipFill>
+        <p:spPr bwMode="auto">
+          <a:xfrm>
+            <a:off x="3643313" y="0"/>
+            <a:ext cx="4903787" cy="6858000"/>
+          </a:xfrm>
+          <a:prstGeom prst="rect">
+            <a:avLst/>
+          </a:prstGeom>
+          <a:noFill/>
+          <a:extLst>
+            <a:ext uri="{909E8E84-426E-40DD-AFC4-6F175D3DCCD1}">
+              <a14:hiddenFill xmlns:a14="http://schemas.microsoft.com/office/drawing/2010/main">
+                <a:solidFill>
+                  <a:srgbClr val="FFFFFF"/>
+                </a:solidFill>
+              </a14:hiddenFill>
+            </a:ext>
+          </a:extLst>
+        </p:spPr>
+      </p:pic>
+    </p:spTree>
+    <p:extLst>
+      <p:ext uri="{BB962C8B-B14F-4D97-AF65-F5344CB8AC3E}">
+        <p14:creationId xmlns:p14="http://schemas.microsoft.com/office/powerpoint/2010/main" val="3174644688"/>
+      </p:ext>
+    </p:extLst>
+  </p:cSld>
+  <p:clrMapOvr>
+    <a:masterClrMapping/>
+  </p:clrMapOvr>
+</p:sld>
+</file>
+
+<file path=ppt/slides/slide29.xml><?xml version="1.0" encoding="utf-8"?>
+<p:sld xmlns:a="http://schemas.openxmlformats.org/drawingml/2006/main" xmlns:r="http://schemas.openxmlformats.org/officeDocument/2006/relationships" xmlns:p="http://schemas.openxmlformats.org/presentationml/2006/main">
+  <p:cSld>
+    <p:spTree>
+      <p:nvGrpSpPr>
+        <p:cNvPr id="1" name=""/>
+        <p:cNvGrpSpPr/>
+        <p:nvPr/>
+      </p:nvGrpSpPr>
+      <p:grpSpPr>
+        <a:xfrm>
+          <a:off x="0" y="0"/>
+          <a:ext cx="0" cy="0"/>
+          <a:chOff x="0" y="0"/>
+          <a:chExt cx="0" cy="0"/>
+        </a:xfrm>
+      </p:grpSpPr>
+      <p:pic>
+        <p:nvPicPr>
+          <p:cNvPr id="3" name="Picture 2">
+            <a:extLst>
+              <a:ext uri="{FF2B5EF4-FFF2-40B4-BE49-F238E27FC236}">
+                <a16:creationId xmlns:a16="http://schemas.microsoft.com/office/drawing/2014/main" id="{72820E22-BCE0-47EA-8585-FE1F58225C02}"/>
+              </a:ext>
+            </a:extLst>
+          </p:cNvPr>
+          <p:cNvPicPr>
+            <a:picLocks noChangeAspect="1"/>
+          </p:cNvPicPr>
+          <p:nvPr/>
+        </p:nvPicPr>
+        <p:blipFill>
+          <a:blip r:embed="rId2"/>
+          <a:stretch>
+            <a:fillRect/>
+          </a:stretch>
+        </p:blipFill>
+        <p:spPr>
+          <a:xfrm>
+            <a:off x="328684" y="675695"/>
+            <a:ext cx="11534632" cy="3395004"/>
+          </a:xfrm>
+          <a:prstGeom prst="rect">
+            <a:avLst/>
+          </a:prstGeom>
+        </p:spPr>
+      </p:pic>
+      <p:pic>
+        <p:nvPicPr>
+          <p:cNvPr id="6146" name="Picture 2">
+            <a:extLst>
+              <a:ext uri="{FF2B5EF4-FFF2-40B4-BE49-F238E27FC236}">
+                <a16:creationId xmlns:a16="http://schemas.microsoft.com/office/drawing/2014/main" id="{0048E9D0-0D56-4510-B091-B4BED0CA4660}"/>
+              </a:ext>
+            </a:extLst>
+          </p:cNvPr>
+          <p:cNvPicPr>
+            <a:picLocks noChangeAspect="1" noChangeArrowheads="1"/>
+          </p:cNvPicPr>
+          <p:nvPr/>
+        </p:nvPicPr>
+        <p:blipFill>
+          <a:blip r:embed="rId3">
+            <a:extLst>
+              <a:ext uri="{28A0092B-C50C-407E-A947-70E740481C1C}">
+                <a14:useLocalDpi xmlns:a14="http://schemas.microsoft.com/office/drawing/2010/main" val="0"/>
+              </a:ext>
+            </a:extLst>
+          </a:blip>
+          <a:srcRect/>
+          <a:stretch>
+            <a:fillRect/>
+          </a:stretch>
+        </p:blipFill>
+        <p:spPr bwMode="auto">
+          <a:xfrm>
+            <a:off x="5444717" y="1975407"/>
+            <a:ext cx="4733925" cy="4019550"/>
+          </a:xfrm>
+          <a:prstGeom prst="rect">
+            <a:avLst/>
+          </a:prstGeom>
+          <a:noFill/>
+          <a:extLst>
+            <a:ext uri="{909E8E84-426E-40DD-AFC4-6F175D3DCCD1}">
+              <a14:hiddenFill xmlns:a14="http://schemas.microsoft.com/office/drawing/2010/main">
+                <a:solidFill>
+                  <a:srgbClr val="FFFFFF"/>
+                </a:solidFill>
+              </a14:hiddenFill>
+            </a:ext>
+          </a:extLst>
+        </p:spPr>
+      </p:pic>
+    </p:spTree>
+    <p:extLst>
+      <p:ext uri="{BB962C8B-B14F-4D97-AF65-F5344CB8AC3E}">
+        <p14:creationId xmlns:p14="http://schemas.microsoft.com/office/powerpoint/2010/main" val="3509319788"/>
+      </p:ext>
+    </p:extLst>
+  </p:cSld>
+  <p:clrMapOvr>
+    <a:masterClrMapping/>
+  </p:clrMapOvr>
+</p:sld>
+</file>
+
+<file path=ppt/slides/slide3.xml><?xml version="1.0" encoding="utf-8"?>
+<p:sld xmlns:a="http://schemas.openxmlformats.org/drawingml/2006/main" xmlns:r="http://schemas.openxmlformats.org/officeDocument/2006/relationships" xmlns:p="http://schemas.openxmlformats.org/presentationml/2006/main">
+  <p:cSld>
+    <p:spTree>
+      <p:nvGrpSpPr>
+        <p:cNvPr id="1" name=""/>
+        <p:cNvGrpSpPr/>
+        <p:nvPr/>
+      </p:nvGrpSpPr>
+      <p:grpSpPr>
+        <a:xfrm>
+          <a:off x="0" y="0"/>
+          <a:ext cx="0" cy="0"/>
+          <a:chOff x="0" y="0"/>
+          <a:chExt cx="0" cy="0"/>
+        </a:xfrm>
+      </p:grpSpPr>
+      <p:pic>
+        <p:nvPicPr>
+          <p:cNvPr id="3" name="Picture 2">
+            <a:extLst>
+              <a:ext uri="{FF2B5EF4-FFF2-40B4-BE49-F238E27FC236}">
+                <a16:creationId xmlns:a16="http://schemas.microsoft.com/office/drawing/2014/main" id="{B6FBA044-A863-4213-A835-8EBC814536B5}"/>
+              </a:ext>
+            </a:extLst>
+          </p:cNvPr>
+          <p:cNvPicPr>
+            <a:picLocks noChangeAspect="1"/>
+          </p:cNvPicPr>
+          <p:nvPr/>
+        </p:nvPicPr>
+        <p:blipFill>
+          <a:blip r:embed="rId2"/>
+          <a:stretch>
+            <a:fillRect/>
+          </a:stretch>
+        </p:blipFill>
+        <p:spPr>
+          <a:xfrm>
+            <a:off x="0" y="289249"/>
+            <a:ext cx="12134835" cy="6279501"/>
+          </a:xfrm>
+          <a:prstGeom prst="rect">
+            <a:avLst/>
+          </a:prstGeom>
+        </p:spPr>
+      </p:pic>
+    </p:spTree>
+    <p:extLst>
+      <p:ext uri="{BB962C8B-B14F-4D97-AF65-F5344CB8AC3E}">
+        <p14:creationId xmlns:p14="http://schemas.microsoft.com/office/powerpoint/2010/main" val="2147088265"/>
+      </p:ext>
+    </p:extLst>
+  </p:cSld>
+  <p:clrMapOvr>
+    <a:masterClrMapping/>
+  </p:clrMapOvr>
+</p:sld>
+</file>
+
+<file path=ppt/slides/slide30.xml><?xml version="1.0" encoding="utf-8"?>
+<p:sld xmlns:a="http://schemas.openxmlformats.org/drawingml/2006/main" xmlns:r="http://schemas.openxmlformats.org/officeDocument/2006/relationships" xmlns:p="http://schemas.openxmlformats.org/presentationml/2006/main">
+  <p:cSld>
+    <p:spTree>
+      <p:nvGrpSpPr>
+        <p:cNvPr id="1" name=""/>
+        <p:cNvGrpSpPr/>
+        <p:nvPr/>
+      </p:nvGrpSpPr>
+      <p:grpSpPr>
+        <a:xfrm>
+          <a:off x="0" y="0"/>
+          <a:ext cx="0" cy="0"/>
+          <a:chOff x="0" y="0"/>
+          <a:chExt cx="0" cy="0"/>
+        </a:xfrm>
+      </p:grpSpPr>
+      <p:pic>
+        <p:nvPicPr>
+          <p:cNvPr id="3" name="Picture 2">
+            <a:extLst>
+              <a:ext uri="{FF2B5EF4-FFF2-40B4-BE49-F238E27FC236}">
+                <a16:creationId xmlns:a16="http://schemas.microsoft.com/office/drawing/2014/main" id="{39BEAF52-9017-47EC-98CA-3591CC6A922C}"/>
+              </a:ext>
+            </a:extLst>
+          </p:cNvPr>
+          <p:cNvPicPr>
+            <a:picLocks noChangeAspect="1"/>
+          </p:cNvPicPr>
+          <p:nvPr/>
+        </p:nvPicPr>
+        <p:blipFill>
+          <a:blip r:embed="rId2"/>
+          <a:stretch>
+            <a:fillRect/>
+          </a:stretch>
+        </p:blipFill>
+        <p:spPr>
+          <a:xfrm>
+            <a:off x="0" y="-2357"/>
+            <a:ext cx="12147333" cy="3162574"/>
+          </a:xfrm>
+          <a:prstGeom prst="rect">
+            <a:avLst/>
+          </a:prstGeom>
+        </p:spPr>
+      </p:pic>
+      <p:pic>
+        <p:nvPicPr>
+          <p:cNvPr id="6" name="Picture 5">
+            <a:extLst>
+              <a:ext uri="{FF2B5EF4-FFF2-40B4-BE49-F238E27FC236}">
+                <a16:creationId xmlns:a16="http://schemas.microsoft.com/office/drawing/2014/main" id="{B52B009A-957E-487B-B776-9D5104DA7EEB}"/>
+              </a:ext>
+            </a:extLst>
+          </p:cNvPr>
+          <p:cNvPicPr>
+            <a:picLocks noChangeAspect="1"/>
+          </p:cNvPicPr>
+          <p:nvPr/>
+        </p:nvPicPr>
+        <p:blipFill>
+          <a:blip r:embed="rId3"/>
+          <a:stretch>
+            <a:fillRect/>
+          </a:stretch>
+        </p:blipFill>
+        <p:spPr>
+          <a:xfrm>
+            <a:off x="2696511" y="1578930"/>
+            <a:ext cx="4107954" cy="4554253"/>
+          </a:xfrm>
+          <a:prstGeom prst="rect">
+            <a:avLst/>
+          </a:prstGeom>
+        </p:spPr>
+      </p:pic>
+      <p:pic>
+        <p:nvPicPr>
+          <p:cNvPr id="8" name="Picture 7">
+            <a:extLst>
+              <a:ext uri="{FF2B5EF4-FFF2-40B4-BE49-F238E27FC236}">
+                <a16:creationId xmlns:a16="http://schemas.microsoft.com/office/drawing/2014/main" id="{138A4406-4D0F-48BB-9562-D888969223C2}"/>
+              </a:ext>
+            </a:extLst>
+          </p:cNvPr>
+          <p:cNvPicPr>
+            <a:picLocks noChangeAspect="1"/>
+          </p:cNvPicPr>
+          <p:nvPr/>
+        </p:nvPicPr>
+        <p:blipFill>
+          <a:blip r:embed="rId4"/>
+          <a:stretch>
+            <a:fillRect/>
+          </a:stretch>
+        </p:blipFill>
+        <p:spPr>
+          <a:xfrm>
+            <a:off x="7441513" y="1425971"/>
+            <a:ext cx="4414652" cy="4860169"/>
+          </a:xfrm>
+          <a:prstGeom prst="rect">
+            <a:avLst/>
+          </a:prstGeom>
+        </p:spPr>
+      </p:pic>
+    </p:spTree>
+    <p:extLst>
+      <p:ext uri="{BB962C8B-B14F-4D97-AF65-F5344CB8AC3E}">
+        <p14:creationId xmlns:p14="http://schemas.microsoft.com/office/powerpoint/2010/main" val="3394863451"/>
+      </p:ext>
+    </p:extLst>
+  </p:cSld>
+  <p:clrMapOvr>
+    <a:masterClrMapping/>
+  </p:clrMapOvr>
+</p:sld>
+</file>
+
+<file path=ppt/slides/slide31.xml><?xml version="1.0" encoding="utf-8"?>
+<p:sld xmlns:a="http://schemas.openxmlformats.org/drawingml/2006/main" xmlns:r="http://schemas.openxmlformats.org/officeDocument/2006/relationships" xmlns:p="http://schemas.openxmlformats.org/presentationml/2006/main">
+  <p:cSld>
+    <p:spTree>
+      <p:nvGrpSpPr>
+        <p:cNvPr id="1" name=""/>
+        <p:cNvGrpSpPr/>
+        <p:nvPr/>
+      </p:nvGrpSpPr>
+      <p:grpSpPr>
+        <a:xfrm>
+          <a:off x="0" y="0"/>
+          <a:ext cx="0" cy="0"/>
+          <a:chOff x="0" y="0"/>
+          <a:chExt cx="0" cy="0"/>
+        </a:xfrm>
+      </p:grpSpPr>
+      <p:pic>
+        <p:nvPicPr>
+          <p:cNvPr id="3" name="Picture 2">
+            <a:extLst>
+              <a:ext uri="{FF2B5EF4-FFF2-40B4-BE49-F238E27FC236}">
+                <a16:creationId xmlns:a16="http://schemas.microsoft.com/office/drawing/2014/main" id="{D8051EF7-FC2B-4137-96A3-BEA812132E08}"/>
+              </a:ext>
+            </a:extLst>
+          </p:cNvPr>
+          <p:cNvPicPr>
+            <a:picLocks noChangeAspect="1"/>
+          </p:cNvPicPr>
+          <p:nvPr/>
+        </p:nvPicPr>
+        <p:blipFill>
+          <a:blip r:embed="rId2"/>
+          <a:stretch>
+            <a:fillRect/>
+          </a:stretch>
+        </p:blipFill>
+        <p:spPr>
+          <a:xfrm>
+            <a:off x="236798" y="337394"/>
+            <a:ext cx="11718403" cy="6183212"/>
+          </a:xfrm>
+          <a:prstGeom prst="rect">
+            <a:avLst/>
+          </a:prstGeom>
+        </p:spPr>
+      </p:pic>
+    </p:spTree>
+    <p:extLst>
+      <p:ext uri="{BB962C8B-B14F-4D97-AF65-F5344CB8AC3E}">
+        <p14:creationId xmlns:p14="http://schemas.microsoft.com/office/powerpoint/2010/main" val="957075670"/>
+      </p:ext>
+    </p:extLst>
+  </p:cSld>
+  <p:clrMapOvr>
+    <a:masterClrMapping/>
+  </p:clrMapOvr>
+</p:sld>
+</file>
+
+<file path=ppt/slides/slide32.xml><?xml version="1.0" encoding="utf-8"?>
+<p:sld xmlns:a="http://schemas.openxmlformats.org/drawingml/2006/main" xmlns:r="http://schemas.openxmlformats.org/officeDocument/2006/relationships" xmlns:p="http://schemas.openxmlformats.org/presentationml/2006/main">
+  <p:cSld>
+    <p:spTree>
+      <p:nvGrpSpPr>
+        <p:cNvPr id="1" name=""/>
+        <p:cNvGrpSpPr/>
+        <p:nvPr/>
+      </p:nvGrpSpPr>
+      <p:grpSpPr>
+        <a:xfrm>
+          <a:off x="0" y="0"/>
+          <a:ext cx="0" cy="0"/>
+          <a:chOff x="0" y="0"/>
+          <a:chExt cx="0" cy="0"/>
+        </a:xfrm>
+      </p:grpSpPr>
+      <p:pic>
+        <p:nvPicPr>
+          <p:cNvPr id="3" name="Picture 2">
+            <a:extLst>
+              <a:ext uri="{FF2B5EF4-FFF2-40B4-BE49-F238E27FC236}">
+                <a16:creationId xmlns:a16="http://schemas.microsoft.com/office/drawing/2014/main" id="{56DF1442-8C69-4B95-AFB8-E4978D3B28C2}"/>
+              </a:ext>
+            </a:extLst>
+          </p:cNvPr>
+          <p:cNvPicPr>
+            <a:picLocks noChangeAspect="1"/>
+          </p:cNvPicPr>
+          <p:nvPr/>
+        </p:nvPicPr>
+        <p:blipFill>
+          <a:blip r:embed="rId2"/>
+          <a:stretch>
+            <a:fillRect/>
+          </a:stretch>
+        </p:blipFill>
+        <p:spPr>
+          <a:xfrm>
+            <a:off x="546636" y="42379"/>
+            <a:ext cx="11098729" cy="6773243"/>
+          </a:xfrm>
+          <a:prstGeom prst="rect">
+            <a:avLst/>
+          </a:prstGeom>
+        </p:spPr>
+      </p:pic>
+    </p:spTree>
+    <p:extLst>
+      <p:ext uri="{BB962C8B-B14F-4D97-AF65-F5344CB8AC3E}">
+        <p14:creationId xmlns:p14="http://schemas.microsoft.com/office/powerpoint/2010/main" val="1376975292"/>
+      </p:ext>
+    </p:extLst>
+  </p:cSld>
+  <p:clrMapOvr>
+    <a:masterClrMapping/>
+  </p:clrMapOvr>
+</p:sld>
+</file>
+
+<file path=ppt/slides/slide33.xml><?xml version="1.0" encoding="utf-8"?>
+<p:sld xmlns:a="http://schemas.openxmlformats.org/drawingml/2006/main" xmlns:r="http://schemas.openxmlformats.org/officeDocument/2006/relationships" xmlns:p="http://schemas.openxmlformats.org/presentationml/2006/main">
+  <p:cSld>
+    <p:spTree>
+      <p:nvGrpSpPr>
+        <p:cNvPr id="1" name=""/>
+        <p:cNvGrpSpPr/>
+        <p:nvPr/>
+      </p:nvGrpSpPr>
+      <p:grpSpPr>
+        <a:xfrm>
+          <a:off x="0" y="0"/>
+          <a:ext cx="0" cy="0"/>
+          <a:chOff x="0" y="0"/>
+          <a:chExt cx="0" cy="0"/>
+        </a:xfrm>
+      </p:grpSpPr>
+      <p:pic>
+        <p:nvPicPr>
+          <p:cNvPr id="3" name="Picture 2">
+            <a:extLst>
+              <a:ext uri="{FF2B5EF4-FFF2-40B4-BE49-F238E27FC236}">
+                <a16:creationId xmlns:a16="http://schemas.microsoft.com/office/drawing/2014/main" id="{8F51E4E4-C8F5-422F-B201-07D58A5B2512}"/>
+              </a:ext>
+            </a:extLst>
+          </p:cNvPr>
+          <p:cNvPicPr>
+            <a:picLocks noChangeAspect="1"/>
+          </p:cNvPicPr>
+          <p:nvPr/>
+        </p:nvPicPr>
+        <p:blipFill>
+          <a:blip r:embed="rId2"/>
+          <a:stretch>
+            <a:fillRect/>
+          </a:stretch>
+        </p:blipFill>
+        <p:spPr>
+          <a:xfrm>
+            <a:off x="33764" y="1721972"/>
+            <a:ext cx="12124471" cy="3414056"/>
+          </a:xfrm>
+          <a:prstGeom prst="rect">
+            <a:avLst/>
+          </a:prstGeom>
+        </p:spPr>
+      </p:pic>
+    </p:spTree>
+    <p:extLst>
+      <p:ext uri="{BB962C8B-B14F-4D97-AF65-F5344CB8AC3E}">
+        <p14:creationId xmlns:p14="http://schemas.microsoft.com/office/powerpoint/2010/main" val="1589410043"/>
+      </p:ext>
+    </p:extLst>
+  </p:cSld>
+  <p:clrMapOvr>
+    <a:masterClrMapping/>
+  </p:clrMapOvr>
+</p:sld>
+</file>
+
+<file path=ppt/slides/slide34.xml><?xml version="1.0" encoding="utf-8"?>
+<p:sld xmlns:a="http://schemas.openxmlformats.org/drawingml/2006/main" xmlns:r="http://schemas.openxmlformats.org/officeDocument/2006/relationships" xmlns:p="http://schemas.openxmlformats.org/presentationml/2006/main">
+  <p:cSld>
+    <p:spTree>
+      <p:nvGrpSpPr>
+        <p:cNvPr id="1" name=""/>
+        <p:cNvGrpSpPr/>
+        <p:nvPr/>
+      </p:nvGrpSpPr>
+      <p:grpSpPr>
+        <a:xfrm>
+          <a:off x="0" y="0"/>
+          <a:ext cx="0" cy="0"/>
+          <a:chOff x="0" y="0"/>
+          <a:chExt cx="0" cy="0"/>
+        </a:xfrm>
+      </p:grpSpPr>
+      <p:pic>
+        <p:nvPicPr>
+          <p:cNvPr id="2" name="Picture 2">
+            <a:extLst>
+              <a:ext uri="{FF2B5EF4-FFF2-40B4-BE49-F238E27FC236}">
+                <a16:creationId xmlns:a16="http://schemas.microsoft.com/office/drawing/2014/main" id="{EAFCECED-5B06-4C35-A865-A6045CB24D80}"/>
+              </a:ext>
+            </a:extLst>
+          </p:cNvPr>
+          <p:cNvPicPr>
+            <a:picLocks noChangeAspect="1" noChangeArrowheads="1"/>
+          </p:cNvPicPr>
+          <p:nvPr/>
+        </p:nvPicPr>
+        <p:blipFill>
+          <a:blip r:embed="rId2">
+            <a:extLst>
+              <a:ext uri="{28A0092B-C50C-407E-A947-70E740481C1C}">
+                <a14:useLocalDpi xmlns:a14="http://schemas.microsoft.com/office/drawing/2010/main" val="0"/>
+              </a:ext>
+            </a:extLst>
+          </a:blip>
+          <a:srcRect/>
+          <a:stretch>
+            <a:fillRect/>
+          </a:stretch>
+        </p:blipFill>
+        <p:spPr bwMode="auto">
+          <a:xfrm>
+            <a:off x="496888" y="0"/>
+            <a:ext cx="11196637" cy="6858000"/>
+          </a:xfrm>
+          <a:prstGeom prst="rect">
+            <a:avLst/>
+          </a:prstGeom>
+          <a:noFill/>
+          <a:extLst>
+            <a:ext uri="{909E8E84-426E-40DD-AFC4-6F175D3DCCD1}">
+              <a14:hiddenFill xmlns:a14="http://schemas.microsoft.com/office/drawing/2010/main">
+                <a:solidFill>
+                  <a:srgbClr val="FFFFFF"/>
+                </a:solidFill>
+              </a14:hiddenFill>
+            </a:ext>
+          </a:extLst>
+        </p:spPr>
+      </p:pic>
+    </p:spTree>
+    <p:extLst>
+      <p:ext uri="{BB962C8B-B14F-4D97-AF65-F5344CB8AC3E}">
+        <p14:creationId xmlns:p14="http://schemas.microsoft.com/office/powerpoint/2010/main" val="3443240664"/>
+      </p:ext>
+    </p:extLst>
+  </p:cSld>
+  <p:clrMapOvr>
+    <a:masterClrMapping/>
+  </p:clrMapOvr>
+</p:sld>
+</file>
+
+<file path=ppt/slides/slide35.xml><?xml version="1.0" encoding="utf-8"?>
+<p:sld xmlns:a="http://schemas.openxmlformats.org/drawingml/2006/main" xmlns:r="http://schemas.openxmlformats.org/officeDocument/2006/relationships" xmlns:p="http://schemas.openxmlformats.org/presentationml/2006/main">
+  <p:cSld>
+    <p:spTree>
+      <p:nvGrpSpPr>
+        <p:cNvPr id="1" name=""/>
+        <p:cNvGrpSpPr/>
+        <p:nvPr/>
+      </p:nvGrpSpPr>
+      <p:grpSpPr>
+        <a:xfrm>
+          <a:off x="0" y="0"/>
+          <a:ext cx="0" cy="0"/>
+          <a:chOff x="0" y="0"/>
+          <a:chExt cx="0" cy="0"/>
+        </a:xfrm>
+      </p:grpSpPr>
+      <p:pic>
+        <p:nvPicPr>
+          <p:cNvPr id="5" name="Picture 4">
+            <a:extLst>
+              <a:ext uri="{FF2B5EF4-FFF2-40B4-BE49-F238E27FC236}">
+                <a16:creationId xmlns:a16="http://schemas.microsoft.com/office/drawing/2014/main" id="{49F8AA1F-C03D-4E1B-80CE-449277B8F544}"/>
+              </a:ext>
+            </a:extLst>
+          </p:cNvPr>
+          <p:cNvPicPr>
+            <a:picLocks noChangeAspect="1"/>
+          </p:cNvPicPr>
+          <p:nvPr/>
+        </p:nvPicPr>
+        <p:blipFill>
+          <a:blip r:embed="rId2"/>
+          <a:stretch>
+            <a:fillRect/>
+          </a:stretch>
+        </p:blipFill>
+        <p:spPr>
+          <a:xfrm>
+            <a:off x="211025" y="1833490"/>
+            <a:ext cx="11769949" cy="3191020"/>
+          </a:xfrm>
+          <a:prstGeom prst="rect">
+            <a:avLst/>
+          </a:prstGeom>
+        </p:spPr>
+      </p:pic>
+    </p:spTree>
+    <p:extLst>
+      <p:ext uri="{BB962C8B-B14F-4D97-AF65-F5344CB8AC3E}">
+        <p14:creationId xmlns:p14="http://schemas.microsoft.com/office/powerpoint/2010/main" val="1976928799"/>
+      </p:ext>
+    </p:extLst>
+  </p:cSld>
+  <p:clrMapOvr>
+    <a:masterClrMapping/>
+  </p:clrMapOvr>
+</p:sld>
+</file>
+
+<file path=ppt/slides/slide36.xml><?xml version="1.0" encoding="utf-8"?>
+<p:sld xmlns:a="http://schemas.openxmlformats.org/drawingml/2006/main" xmlns:r="http://schemas.openxmlformats.org/officeDocument/2006/relationships" xmlns:p="http://schemas.openxmlformats.org/presentationml/2006/main">
+  <p:cSld>
+    <p:spTree>
+      <p:nvGrpSpPr>
+        <p:cNvPr id="1" name=""/>
+        <p:cNvGrpSpPr/>
+        <p:nvPr/>
+      </p:nvGrpSpPr>
+      <p:grpSpPr>
+        <a:xfrm>
+          <a:off x="0" y="0"/>
+          <a:ext cx="0" cy="0"/>
+          <a:chOff x="0" y="0"/>
+          <a:chExt cx="0" cy="0"/>
+        </a:xfrm>
+      </p:grpSpPr>
+    </p:spTree>
+    <p:extLst>
+      <p:ext uri="{BB962C8B-B14F-4D97-AF65-F5344CB8AC3E}">
+        <p14:creationId xmlns:p14="http://schemas.microsoft.com/office/powerpoint/2010/main" val="106552295"/>
+      </p:ext>
+    </p:extLst>
+  </p:cSld>
+  <p:clrMapOvr>
+    <a:masterClrMapping/>
+  </p:clrMapOvr>
+</p:sld>
+</file>
+
+<file path=ppt/slides/slide37.xml><?xml version="1.0" encoding="utf-8"?>
+<p:sld xmlns:a="http://schemas.openxmlformats.org/drawingml/2006/main" xmlns:r="http://schemas.openxmlformats.org/officeDocument/2006/relationships" xmlns:p="http://schemas.openxmlformats.org/presentationml/2006/main">
+  <p:cSld>
+    <p:spTree>
+      <p:nvGrpSpPr>
+        <p:cNvPr id="1" name=""/>
+        <p:cNvGrpSpPr/>
+        <p:nvPr/>
+      </p:nvGrpSpPr>
+      <p:grpSpPr>
+        <a:xfrm>
+          <a:off x="0" y="0"/>
+          <a:ext cx="0" cy="0"/>
+          <a:chOff x="0" y="0"/>
+          <a:chExt cx="0" cy="0"/>
+        </a:xfrm>
+      </p:grpSpPr>
+    </p:spTree>
+    <p:extLst>
+      <p:ext uri="{BB962C8B-B14F-4D97-AF65-F5344CB8AC3E}">
+        <p14:creationId xmlns:p14="http://schemas.microsoft.com/office/powerpoint/2010/main" val="789112579"/>
+      </p:ext>
+    </p:extLst>
+  </p:cSld>
+  <p:clrMapOvr>
+    <a:masterClrMapping/>
+  </p:clrMapOvr>
+</p:sld>
+</file>
+
+<file path=ppt/slides/slide38.xml><?xml version="1.0" encoding="utf-8"?>
+<p:sld xmlns:a="http://schemas.openxmlformats.org/drawingml/2006/main" xmlns:r="http://schemas.openxmlformats.org/officeDocument/2006/relationships" xmlns:p="http://schemas.openxmlformats.org/presentationml/2006/main">
+  <p:cSld>
+    <p:spTree>
+      <p:nvGrpSpPr>
+        <p:cNvPr id="1" name=""/>
+        <p:cNvGrpSpPr/>
+        <p:nvPr/>
+      </p:nvGrpSpPr>
+      <p:grpSpPr>
+        <a:xfrm>
+          <a:off x="0" y="0"/>
+          <a:ext cx="0" cy="0"/>
+          <a:chOff x="0" y="0"/>
+          <a:chExt cx="0" cy="0"/>
+        </a:xfrm>
+      </p:grpSpPr>
+    </p:spTree>
+    <p:extLst>
+      <p:ext uri="{BB962C8B-B14F-4D97-AF65-F5344CB8AC3E}">
+        <p14:creationId xmlns:p14="http://schemas.microsoft.com/office/powerpoint/2010/main" val="2447166865"/>
+      </p:ext>
+    </p:extLst>
+  </p:cSld>
+  <p:clrMapOvr>
+    <a:masterClrMapping/>
+  </p:clrMapOvr>
+</p:sld>
+</file>
+
+<file path=ppt/slides/slide4.xml><?xml version="1.0" encoding="utf-8"?>
+<p:sld xmlns:a="http://schemas.openxmlformats.org/drawingml/2006/main" xmlns:r="http://schemas.openxmlformats.org/officeDocument/2006/relationships" xmlns:p="http://schemas.openxmlformats.org/presentationml/2006/main">
+  <p:cSld>
+    <p:spTree>
+      <p:nvGrpSpPr>
+        <p:cNvPr id="1" name=""/>
+        <p:cNvGrpSpPr/>
+        <p:nvPr/>
+      </p:nvGrpSpPr>
+      <p:grpSpPr>
+        <a:xfrm>
+          <a:off x="0" y="0"/>
+          <a:ext cx="0" cy="0"/>
+          <a:chOff x="0" y="0"/>
+          <a:chExt cx="0" cy="0"/>
+        </a:xfrm>
+      </p:grpSpPr>
+      <p:pic>
+        <p:nvPicPr>
+          <p:cNvPr id="1026" name="Picture 2">
+            <a:extLst>
+              <a:ext uri="{FF2B5EF4-FFF2-40B4-BE49-F238E27FC236}">
+                <a16:creationId xmlns:a16="http://schemas.microsoft.com/office/drawing/2014/main" id="{3D033FE4-940D-442F-85F6-2A7B83CDD360}"/>
+              </a:ext>
+            </a:extLst>
+          </p:cNvPr>
+          <p:cNvPicPr>
+            <a:picLocks noChangeAspect="1" noChangeArrowheads="1"/>
+          </p:cNvPicPr>
+          <p:nvPr/>
+        </p:nvPicPr>
+        <p:blipFill>
+          <a:blip r:embed="rId2">
+            <a:extLst>
+              <a:ext uri="{28A0092B-C50C-407E-A947-70E740481C1C}">
+                <a14:useLocalDpi xmlns:a14="http://schemas.microsoft.com/office/drawing/2010/main" val="0"/>
+              </a:ext>
+            </a:extLst>
+          </a:blip>
+          <a:srcRect/>
+          <a:stretch>
+            <a:fillRect/>
+          </a:stretch>
+        </p:blipFill>
+        <p:spPr bwMode="auto">
+          <a:xfrm>
+            <a:off x="0" y="595313"/>
+            <a:ext cx="12192000" cy="5667375"/>
+          </a:xfrm>
+          <a:prstGeom prst="rect">
+            <a:avLst/>
+          </a:prstGeom>
+          <a:noFill/>
+          <a:extLst>
+            <a:ext uri="{909E8E84-426E-40DD-AFC4-6F175D3DCCD1}">
+              <a14:hiddenFill xmlns:a14="http://schemas.microsoft.com/office/drawing/2010/main">
+                <a:solidFill>
+                  <a:srgbClr val="FFFFFF"/>
+                </a:solidFill>
+              </a14:hiddenFill>
+            </a:ext>
+          </a:extLst>
+        </p:spPr>
+      </p:pic>
+    </p:spTree>
+    <p:extLst>
+      <p:ext uri="{BB962C8B-B14F-4D97-AF65-F5344CB8AC3E}">
+        <p14:creationId xmlns:p14="http://schemas.microsoft.com/office/powerpoint/2010/main" val="2811335968"/>
+      </p:ext>
+    </p:extLst>
+  </p:cSld>
+  <p:clrMapOvr>
+    <a:masterClrMapping/>
+  </p:clrMapOvr>
+</p:sld>
+</file>
+
+<file path=ppt/slides/slide5.xml><?xml version="1.0" encoding="utf-8"?>
+<p:sld xmlns:a="http://schemas.openxmlformats.org/drawingml/2006/main" xmlns:r="http://schemas.openxmlformats.org/officeDocument/2006/relationships" xmlns:p="http://schemas.openxmlformats.org/presentationml/2006/main">
+  <p:cSld>
+    <p:spTree>
+      <p:nvGrpSpPr>
+        <p:cNvPr id="1" name=""/>
+        <p:cNvGrpSpPr/>
+        <p:nvPr/>
+      </p:nvGrpSpPr>
+      <p:grpSpPr>
+        <a:xfrm>
+          <a:off x="0" y="0"/>
+          <a:ext cx="0" cy="0"/>
+          <a:chOff x="0" y="0"/>
+          <a:chExt cx="0" cy="0"/>
+        </a:xfrm>
+      </p:grpSpPr>
+      <p:pic>
+        <p:nvPicPr>
+          <p:cNvPr id="2050" name="Picture 2">
+            <a:extLst>
+              <a:ext uri="{FF2B5EF4-FFF2-40B4-BE49-F238E27FC236}">
+                <a16:creationId xmlns:a16="http://schemas.microsoft.com/office/drawing/2014/main" id="{30744069-C231-45C1-95A5-4AAC46B513E5}"/>
+              </a:ext>
+            </a:extLst>
+          </p:cNvPr>
+          <p:cNvPicPr>
+            <a:picLocks noChangeAspect="1" noChangeArrowheads="1"/>
+          </p:cNvPicPr>
+          <p:nvPr/>
+        </p:nvPicPr>
+        <p:blipFill>
+          <a:blip r:embed="rId2">
+            <a:extLst>
+              <a:ext uri="{28A0092B-C50C-407E-A947-70E740481C1C}">
+                <a14:useLocalDpi xmlns:a14="http://schemas.microsoft.com/office/drawing/2010/main" val="0"/>
+              </a:ext>
+            </a:extLst>
+          </a:blip>
+          <a:srcRect/>
+          <a:stretch>
+            <a:fillRect/>
+          </a:stretch>
+        </p:blipFill>
+        <p:spPr bwMode="auto">
+          <a:xfrm>
+            <a:off x="0" y="595313"/>
+            <a:ext cx="12192000" cy="5667375"/>
+          </a:xfrm>
+          <a:prstGeom prst="rect">
+            <a:avLst/>
+          </a:prstGeom>
+          <a:noFill/>
+          <a:extLst>
+            <a:ext uri="{909E8E84-426E-40DD-AFC4-6F175D3DCCD1}">
+              <a14:hiddenFill xmlns:a14="http://schemas.microsoft.com/office/drawing/2010/main">
+                <a:solidFill>
+                  <a:srgbClr val="FFFFFF"/>
+                </a:solidFill>
+              </a14:hiddenFill>
+            </a:ext>
+          </a:extLst>
+        </p:spPr>
+      </p:pic>
+    </p:spTree>
+    <p:extLst>
+      <p:ext uri="{BB962C8B-B14F-4D97-AF65-F5344CB8AC3E}">
+        <p14:creationId xmlns:p14="http://schemas.microsoft.com/office/powerpoint/2010/main" val="246421838"/>
+      </p:ext>
+    </p:extLst>
+  </p:cSld>
+  <p:clrMapOvr>
+    <a:masterClrMapping/>
+  </p:clrMapOvr>
+</p:sld>
+</file>
+
+<file path=ppt/slides/slide6.xml><?xml version="1.0" encoding="utf-8"?>
+<p:sld xmlns:a="http://schemas.openxmlformats.org/drawingml/2006/main" xmlns:r="http://schemas.openxmlformats.org/officeDocument/2006/relationships" xmlns:p="http://schemas.openxmlformats.org/presentationml/2006/main">
+  <p:cSld>
+    <p:spTree>
+      <p:nvGrpSpPr>
+        <p:cNvPr id="1" name=""/>
+        <p:cNvGrpSpPr/>
+        <p:nvPr/>
+      </p:nvGrpSpPr>
+      <p:grpSpPr>
+        <a:xfrm>
+          <a:off x="0" y="0"/>
+          <a:ext cx="0" cy="0"/>
+          <a:chOff x="0" y="0"/>
+          <a:chExt cx="0" cy="0"/>
+        </a:xfrm>
+      </p:grpSpPr>
+      <p:pic>
+        <p:nvPicPr>
+          <p:cNvPr id="3" name="Picture 2">
+            <a:extLst>
+              <a:ext uri="{FF2B5EF4-FFF2-40B4-BE49-F238E27FC236}">
+                <a16:creationId xmlns:a16="http://schemas.microsoft.com/office/drawing/2014/main" id="{70A46FF3-91BD-4281-9355-447CBD4083FF}"/>
+              </a:ext>
+            </a:extLst>
+          </p:cNvPr>
+          <p:cNvPicPr>
+            <a:picLocks noChangeAspect="1"/>
+          </p:cNvPicPr>
+          <p:nvPr/>
+        </p:nvPicPr>
+        <p:blipFill>
+          <a:blip r:embed="rId2"/>
+          <a:stretch>
+            <a:fillRect/>
+          </a:stretch>
+        </p:blipFill>
+        <p:spPr>
+          <a:xfrm>
+            <a:off x="471190" y="395290"/>
+            <a:ext cx="11249620" cy="6067419"/>
+          </a:xfrm>
+          <a:prstGeom prst="rect">
+            <a:avLst/>
+          </a:prstGeom>
+        </p:spPr>
+      </p:pic>
+    </p:spTree>
+    <p:extLst>
+      <p:ext uri="{BB962C8B-B14F-4D97-AF65-F5344CB8AC3E}">
+        <p14:creationId xmlns:p14="http://schemas.microsoft.com/office/powerpoint/2010/main" val="3354423593"/>
+      </p:ext>
+    </p:extLst>
+  </p:cSld>
+  <p:clrMapOvr>
+    <a:masterClrMapping/>
+  </p:clrMapOvr>
+</p:sld>
+</file>
+
+<file path=ppt/slides/slide7.xml><?xml version="1.0" encoding="utf-8"?>
+<p:sld xmlns:a="http://schemas.openxmlformats.org/drawingml/2006/main" xmlns:r="http://schemas.openxmlformats.org/officeDocument/2006/relationships" xmlns:p="http://schemas.openxmlformats.org/presentationml/2006/main">
+  <p:cSld>
+    <p:spTree>
+      <p:nvGrpSpPr>
+        <p:cNvPr id="1" name=""/>
+        <p:cNvGrpSpPr/>
+        <p:nvPr/>
+      </p:nvGrpSpPr>
+      <p:grpSpPr>
+        <a:xfrm>
+          <a:off x="0" y="0"/>
+          <a:ext cx="0" cy="0"/>
+          <a:chOff x="0" y="0"/>
+          <a:chExt cx="0" cy="0"/>
+        </a:xfrm>
+      </p:grpSpPr>
+      <p:pic>
+        <p:nvPicPr>
+          <p:cNvPr id="3" name="Picture 2">
+            <a:extLst>
+              <a:ext uri="{FF2B5EF4-FFF2-40B4-BE49-F238E27FC236}">
+                <a16:creationId xmlns:a16="http://schemas.microsoft.com/office/drawing/2014/main" id="{06EA2C7C-E213-449B-9184-C594563DC0D7}"/>
+              </a:ext>
+            </a:extLst>
+          </p:cNvPr>
+          <p:cNvPicPr>
+            <a:picLocks noChangeAspect="1"/>
+          </p:cNvPicPr>
+          <p:nvPr/>
+        </p:nvPicPr>
+        <p:blipFill>
+          <a:blip r:embed="rId2"/>
+          <a:stretch>
+            <a:fillRect/>
+          </a:stretch>
+        </p:blipFill>
+        <p:spPr>
+          <a:xfrm>
+            <a:off x="436150" y="523003"/>
+            <a:ext cx="11319699" cy="5811995"/>
+          </a:xfrm>
+          <a:prstGeom prst="rect">
+            <a:avLst/>
+          </a:prstGeom>
+        </p:spPr>
+      </p:pic>
+    </p:spTree>
+    <p:extLst>
+      <p:ext uri="{BB962C8B-B14F-4D97-AF65-F5344CB8AC3E}">
+        <p14:creationId xmlns:p14="http://schemas.microsoft.com/office/powerpoint/2010/main" val="3261327023"/>
+      </p:ext>
+    </p:extLst>
+  </p:cSld>
+  <p:clrMapOvr>
+    <a:masterClrMapping/>
+  </p:clrMapOvr>
+</p:sld>
+</file>
+
+<file path=ppt/slides/slide8.xml><?xml version="1.0" encoding="utf-8"?>
+<p:sld xmlns:a="http://schemas.openxmlformats.org/drawingml/2006/main" xmlns:r="http://schemas.openxmlformats.org/officeDocument/2006/relationships" xmlns:p="http://schemas.openxmlformats.org/presentationml/2006/main">
+  <p:cSld>
+    <p:spTree>
+      <p:nvGrpSpPr>
+        <p:cNvPr id="1" name=""/>
+        <p:cNvGrpSpPr/>
+        <p:nvPr/>
+      </p:nvGrpSpPr>
+      <p:grpSpPr>
+        <a:xfrm>
+          <a:off x="0" y="0"/>
+          <a:ext cx="0" cy="0"/>
+          <a:chOff x="0" y="0"/>
+          <a:chExt cx="0" cy="0"/>
+        </a:xfrm>
+      </p:grpSpPr>
+      <p:pic>
+        <p:nvPicPr>
+          <p:cNvPr id="3" name="Picture 2">
+            <a:extLst>
+              <a:ext uri="{FF2B5EF4-FFF2-40B4-BE49-F238E27FC236}">
+                <a16:creationId xmlns:a16="http://schemas.microsoft.com/office/drawing/2014/main" id="{1EA92469-E905-4047-BF9D-6FA0235E872B}"/>
+              </a:ext>
+            </a:extLst>
+          </p:cNvPr>
+          <p:cNvPicPr>
+            <a:picLocks noChangeAspect="1"/>
+          </p:cNvPicPr>
+          <p:nvPr/>
+        </p:nvPicPr>
+        <p:blipFill>
+          <a:blip r:embed="rId2"/>
+          <a:stretch>
+            <a:fillRect/>
+          </a:stretch>
+        </p:blipFill>
+        <p:spPr>
+          <a:xfrm>
+            <a:off x="710936" y="132493"/>
+            <a:ext cx="10770126" cy="6593014"/>
+          </a:xfrm>
+          <a:prstGeom prst="rect">
+            <a:avLst/>
+          </a:prstGeom>
+        </p:spPr>
+      </p:pic>
+    </p:spTree>
+    <p:extLst>
+      <p:ext uri="{BB962C8B-B14F-4D97-AF65-F5344CB8AC3E}">
+        <p14:creationId xmlns:p14="http://schemas.microsoft.com/office/powerpoint/2010/main" val="4041735636"/>
+      </p:ext>
+    </p:extLst>
+  </p:cSld>
+  <p:clrMapOvr>
+    <a:masterClrMapping/>
+  </p:clrMapOvr>
+</p:sld>
+</file>
+
+<file path=ppt/slides/slide9.xml><?xml version="1.0" encoding="utf-8"?>
+<p:sld xmlns:a="http://schemas.openxmlformats.org/drawingml/2006/main" xmlns:r="http://schemas.openxmlformats.org/officeDocument/2006/relationships" xmlns:p="http://schemas.openxmlformats.org/presentationml/2006/main">
+  <p:cSld>
+    <p:spTree>
+      <p:nvGrpSpPr>
+        <p:cNvPr id="1" name=""/>
+        <p:cNvGrpSpPr/>
+        <p:nvPr/>
+      </p:nvGrpSpPr>
+      <p:grpSpPr>
+        <a:xfrm>
+          <a:off x="0" y="0"/>
+          <a:ext cx="0" cy="0"/>
+          <a:chOff x="0" y="0"/>
+          <a:chExt cx="0" cy="0"/>
+        </a:xfrm>
+      </p:grpSpPr>
+      <p:pic>
+        <p:nvPicPr>
+          <p:cNvPr id="3" name="Picture 2">
+            <a:extLst>
+              <a:ext uri="{FF2B5EF4-FFF2-40B4-BE49-F238E27FC236}">
+                <a16:creationId xmlns:a16="http://schemas.microsoft.com/office/drawing/2014/main" id="{C16E9EFA-1873-40CB-B101-CD980E44A769}"/>
+              </a:ext>
+            </a:extLst>
+          </p:cNvPr>
+          <p:cNvPicPr>
+            <a:picLocks noChangeAspect="1"/>
+          </p:cNvPicPr>
+          <p:nvPr/>
+        </p:nvPicPr>
+        <p:blipFill>
+          <a:blip r:embed="rId2"/>
+          <a:stretch>
+            <a:fillRect/>
+          </a:stretch>
+        </p:blipFill>
+        <p:spPr>
+          <a:xfrm>
+            <a:off x="2029540" y="256977"/>
+            <a:ext cx="8132920" cy="6344047"/>
+          </a:xfrm>
+          <a:prstGeom prst="rect">
+            <a:avLst/>
+          </a:prstGeom>
+        </p:spPr>
+      </p:pic>
+    </p:spTree>
+    <p:extLst>
+      <p:ext uri="{BB962C8B-B14F-4D97-AF65-F5344CB8AC3E}">
+        <p14:creationId xmlns:p14="http://schemas.microsoft.com/office/powerpoint/2010/main" val="366329884"/>
       </p:ext>
     </p:extLst>
   </p:cSld>

</xml_diff>